<commit_message>
added slides for video.
</commit_message>
<xml_diff>
--- a/TOG_Paper/figures.pptx
+++ b/TOG_Paper/figures.pptx
@@ -202,7 +202,7 @@
           <a:p>
             <a:fld id="{4124E618-6992-4B85-958A-B5B4B6B9F3C2}" type="datetimeFigureOut">
               <a:rPr lang="en-US" smtClean="0"/>
-              <a:t>7/13/2013</a:t>
+              <a:t>7/14/2013</a:t>
             </a:fld>
             <a:endParaRPr lang="en-US" dirty="0"/>
           </a:p>
@@ -1097,7 +1097,7 @@
             <a:fld id="{1D8BD707-D9CF-40AE-B4C6-C98DA3205C09}" type="datetimeFigureOut">
               <a:rPr lang="en-US" smtClean="0"/>
               <a:pPr/>
-              <a:t>7/13/2013</a:t>
+              <a:t>7/14/2013</a:t>
             </a:fld>
             <a:endParaRPr lang="en-US" dirty="0"/>
           </a:p>
@@ -1264,7 +1264,7 @@
             <a:fld id="{1D8BD707-D9CF-40AE-B4C6-C98DA3205C09}" type="datetimeFigureOut">
               <a:rPr lang="en-US" smtClean="0"/>
               <a:pPr/>
-              <a:t>7/13/2013</a:t>
+              <a:t>7/14/2013</a:t>
             </a:fld>
             <a:endParaRPr lang="en-US" dirty="0"/>
           </a:p>
@@ -1441,7 +1441,7 @@
             <a:fld id="{1D8BD707-D9CF-40AE-B4C6-C98DA3205C09}" type="datetimeFigureOut">
               <a:rPr lang="en-US" smtClean="0"/>
               <a:pPr/>
-              <a:t>7/13/2013</a:t>
+              <a:t>7/14/2013</a:t>
             </a:fld>
             <a:endParaRPr lang="en-US" dirty="0"/>
           </a:p>
@@ -1608,7 +1608,7 @@
             <a:fld id="{1D8BD707-D9CF-40AE-B4C6-C98DA3205C09}" type="datetimeFigureOut">
               <a:rPr lang="en-US" smtClean="0"/>
               <a:pPr/>
-              <a:t>7/13/2013</a:t>
+              <a:t>7/14/2013</a:t>
             </a:fld>
             <a:endParaRPr lang="en-US" dirty="0"/>
           </a:p>
@@ -1851,7 +1851,7 @@
             <a:fld id="{1D8BD707-D9CF-40AE-B4C6-C98DA3205C09}" type="datetimeFigureOut">
               <a:rPr lang="en-US" smtClean="0"/>
               <a:pPr/>
-              <a:t>7/13/2013</a:t>
+              <a:t>7/14/2013</a:t>
             </a:fld>
             <a:endParaRPr lang="en-US" dirty="0"/>
           </a:p>
@@ -2136,7 +2136,7 @@
             <a:fld id="{1D8BD707-D9CF-40AE-B4C6-C98DA3205C09}" type="datetimeFigureOut">
               <a:rPr lang="en-US" smtClean="0"/>
               <a:pPr/>
-              <a:t>7/13/2013</a:t>
+              <a:t>7/14/2013</a:t>
             </a:fld>
             <a:endParaRPr lang="en-US" dirty="0"/>
           </a:p>
@@ -2555,7 +2555,7 @@
             <a:fld id="{1D8BD707-D9CF-40AE-B4C6-C98DA3205C09}" type="datetimeFigureOut">
               <a:rPr lang="en-US" smtClean="0"/>
               <a:pPr/>
-              <a:t>7/13/2013</a:t>
+              <a:t>7/14/2013</a:t>
             </a:fld>
             <a:endParaRPr lang="en-US" dirty="0"/>
           </a:p>
@@ -2670,7 +2670,7 @@
             <a:fld id="{1D8BD707-D9CF-40AE-B4C6-C98DA3205C09}" type="datetimeFigureOut">
               <a:rPr lang="en-US" smtClean="0"/>
               <a:pPr/>
-              <a:t>7/13/2013</a:t>
+              <a:t>7/14/2013</a:t>
             </a:fld>
             <a:endParaRPr lang="en-US" dirty="0"/>
           </a:p>
@@ -2762,7 +2762,7 @@
             <a:fld id="{1D8BD707-D9CF-40AE-B4C6-C98DA3205C09}" type="datetimeFigureOut">
               <a:rPr lang="en-US" smtClean="0"/>
               <a:pPr/>
-              <a:t>7/13/2013</a:t>
+              <a:t>7/14/2013</a:t>
             </a:fld>
             <a:endParaRPr lang="en-US" dirty="0"/>
           </a:p>
@@ -3036,7 +3036,7 @@
             <a:fld id="{1D8BD707-D9CF-40AE-B4C6-C98DA3205C09}" type="datetimeFigureOut">
               <a:rPr lang="en-US" smtClean="0"/>
               <a:pPr/>
-              <a:t>7/13/2013</a:t>
+              <a:t>7/14/2013</a:t>
             </a:fld>
             <a:endParaRPr lang="en-US" dirty="0"/>
           </a:p>
@@ -3286,7 +3286,7 @@
             <a:fld id="{1D8BD707-D9CF-40AE-B4C6-C98DA3205C09}" type="datetimeFigureOut">
               <a:rPr lang="en-US" smtClean="0"/>
               <a:pPr/>
-              <a:t>7/13/2013</a:t>
+              <a:t>7/14/2013</a:t>
             </a:fld>
             <a:endParaRPr lang="en-US" dirty="0"/>
           </a:p>
@@ -3496,7 +3496,7 @@
             <a:fld id="{1D8BD707-D9CF-40AE-B4C6-C98DA3205C09}" type="datetimeFigureOut">
               <a:rPr lang="en-US" smtClean="0"/>
               <a:pPr/>
-              <a:t>7/13/2013</a:t>
+              <a:t>7/14/2013</a:t>
             </a:fld>
             <a:endParaRPr lang="en-US" dirty="0"/>
           </a:p>
@@ -3883,10 +3883,14 @@
           <a:lstStyle/>
           <a:p>
             <a:r>
-              <a:rPr lang="en-US" dirty="0" smtClean="0"/>
+              <a:rPr lang="en-US" dirty="0" smtClean="0">
+                <a:latin typeface="Baskervald ADF Std" pitchFamily="18" charset="0"/>
+              </a:rPr>
               <a:t>Figures for TOG paper</a:t>
             </a:r>
-            <a:endParaRPr lang="en-US" dirty="0"/>
+            <a:endParaRPr lang="en-US" dirty="0">
+              <a:latin typeface="Baskervald ADF Std" pitchFamily="18" charset="0"/>
+            </a:endParaRPr>
           </a:p>
         </p:txBody>
       </p:sp>
@@ -4109,7 +4113,7 @@
         </p:nvSpPr>
         <p:spPr>
           <a:xfrm>
-            <a:off x="971502" y="260560"/>
+            <a:off x="221321" y="43152"/>
             <a:ext cx="4342407" cy="369332"/>
           </a:xfrm>
           <a:prstGeom prst="rect">
@@ -4124,10 +4128,14 @@
           <a:lstStyle/>
           <a:p>
             <a:r>
-              <a:rPr lang="en-US" dirty="0" smtClean="0"/>
+              <a:rPr lang="en-US" dirty="0" smtClean="0">
+                <a:latin typeface="Baskervald ADF Std" pitchFamily="18" charset="0"/>
+              </a:rPr>
               <a:t>Note, brightness and contrast were adjusted</a:t>
             </a:r>
-            <a:endParaRPr lang="en-US" dirty="0"/>
+            <a:endParaRPr lang="en-US" dirty="0">
+              <a:latin typeface="Baskervald ADF Std" pitchFamily="18" charset="0"/>
+            </a:endParaRPr>
           </a:p>
         </p:txBody>
       </p:sp>
@@ -5571,7 +5579,9 @@
           <a:lstStyle/>
           <a:p>
             <a:pPr algn="ctr"/>
-            <a:endParaRPr lang="en-US" dirty="0"/>
+            <a:endParaRPr lang="en-US" dirty="0">
+              <a:latin typeface="Baskervald ADF Std" pitchFamily="18" charset="0"/>
+            </a:endParaRPr>
           </a:p>
         </p:txBody>
       </p:sp>
@@ -5619,7 +5629,9 @@
           <a:lstStyle/>
           <a:p>
             <a:pPr algn="ctr"/>
-            <a:endParaRPr lang="en-US" dirty="0"/>
+            <a:endParaRPr lang="en-US" dirty="0">
+              <a:latin typeface="Baskervald ADF Std" pitchFamily="18" charset="0"/>
+            </a:endParaRPr>
           </a:p>
         </p:txBody>
       </p:sp>
@@ -5667,7 +5679,9 @@
           <a:lstStyle/>
           <a:p>
             <a:pPr algn="ctr"/>
-            <a:endParaRPr lang="en-US" dirty="0"/>
+            <a:endParaRPr lang="en-US" dirty="0">
+              <a:latin typeface="Baskervald ADF Std" pitchFamily="18" charset="0"/>
+            </a:endParaRPr>
           </a:p>
         </p:txBody>
       </p:sp>
@@ -5715,7 +5729,9 @@
           <a:lstStyle/>
           <a:p>
             <a:pPr algn="ctr"/>
-            <a:endParaRPr lang="en-US" dirty="0"/>
+            <a:endParaRPr lang="en-US" dirty="0">
+              <a:latin typeface="Baskervald ADF Std" pitchFamily="18" charset="0"/>
+            </a:endParaRPr>
           </a:p>
         </p:txBody>
       </p:sp>
@@ -5763,7 +5779,9 @@
           <a:lstStyle/>
           <a:p>
             <a:pPr algn="ctr"/>
-            <a:endParaRPr lang="en-US" dirty="0"/>
+            <a:endParaRPr lang="en-US" dirty="0">
+              <a:latin typeface="Baskervald ADF Std" pitchFamily="18" charset="0"/>
+            </a:endParaRPr>
           </a:p>
         </p:txBody>
       </p:sp>
@@ -5811,7 +5829,9 @@
           <a:lstStyle/>
           <a:p>
             <a:pPr algn="ctr"/>
-            <a:endParaRPr lang="en-US" dirty="0"/>
+            <a:endParaRPr lang="en-US" dirty="0">
+              <a:latin typeface="Baskervald ADF Std" pitchFamily="18" charset="0"/>
+            </a:endParaRPr>
           </a:p>
         </p:txBody>
       </p:sp>
@@ -5859,7 +5879,9 @@
           <a:lstStyle/>
           <a:p>
             <a:pPr algn="ctr"/>
-            <a:endParaRPr lang="en-US" dirty="0"/>
+            <a:endParaRPr lang="en-US" dirty="0">
+              <a:latin typeface="Baskervald ADF Std" pitchFamily="18" charset="0"/>
+            </a:endParaRPr>
           </a:p>
         </p:txBody>
       </p:sp>
@@ -5907,7 +5929,9 @@
           <a:lstStyle/>
           <a:p>
             <a:pPr algn="ctr"/>
-            <a:endParaRPr lang="en-US" dirty="0"/>
+            <a:endParaRPr lang="en-US" dirty="0">
+              <a:latin typeface="Baskervald ADF Std" pitchFamily="18" charset="0"/>
+            </a:endParaRPr>
           </a:p>
         </p:txBody>
       </p:sp>
@@ -5955,7 +5979,9 @@
           <a:lstStyle/>
           <a:p>
             <a:pPr algn="ctr"/>
-            <a:endParaRPr lang="en-US" dirty="0"/>
+            <a:endParaRPr lang="en-US" dirty="0">
+              <a:latin typeface="Baskervald ADF Std" pitchFamily="18" charset="0"/>
+            </a:endParaRPr>
           </a:p>
         </p:txBody>
       </p:sp>
@@ -6003,7 +6029,9 @@
           <a:lstStyle/>
           <a:p>
             <a:pPr algn="ctr"/>
-            <a:endParaRPr lang="en-US" dirty="0"/>
+            <a:endParaRPr lang="en-US" dirty="0">
+              <a:latin typeface="Baskervald ADF Std" pitchFamily="18" charset="0"/>
+            </a:endParaRPr>
           </a:p>
         </p:txBody>
       </p:sp>
@@ -6051,7 +6079,9 @@
           <a:lstStyle/>
           <a:p>
             <a:pPr algn="ctr"/>
-            <a:endParaRPr lang="en-US" dirty="0"/>
+            <a:endParaRPr lang="en-US" dirty="0">
+              <a:latin typeface="Baskervald ADF Std" pitchFamily="18" charset="0"/>
+            </a:endParaRPr>
           </a:p>
         </p:txBody>
       </p:sp>
@@ -6099,7 +6129,9 @@
           <a:lstStyle/>
           <a:p>
             <a:pPr algn="ctr"/>
-            <a:endParaRPr lang="en-US" dirty="0"/>
+            <a:endParaRPr lang="en-US" dirty="0">
+              <a:latin typeface="Baskervald ADF Std" pitchFamily="18" charset="0"/>
+            </a:endParaRPr>
           </a:p>
         </p:txBody>
       </p:sp>
@@ -6147,7 +6179,9 @@
           <a:lstStyle/>
           <a:p>
             <a:pPr algn="ctr"/>
-            <a:endParaRPr lang="en-US" dirty="0"/>
+            <a:endParaRPr lang="en-US" dirty="0">
+              <a:latin typeface="Baskervald ADF Std" pitchFamily="18" charset="0"/>
+            </a:endParaRPr>
           </a:p>
         </p:txBody>
       </p:sp>
@@ -6195,7 +6229,9 @@
           <a:lstStyle/>
           <a:p>
             <a:pPr algn="ctr"/>
-            <a:endParaRPr lang="en-US" dirty="0"/>
+            <a:endParaRPr lang="en-US" dirty="0">
+              <a:latin typeface="Baskervald ADF Std" pitchFamily="18" charset="0"/>
+            </a:endParaRPr>
           </a:p>
         </p:txBody>
       </p:sp>
@@ -6243,7 +6279,9 @@
           <a:lstStyle/>
           <a:p>
             <a:pPr algn="ctr"/>
-            <a:endParaRPr lang="en-US" dirty="0"/>
+            <a:endParaRPr lang="en-US" dirty="0">
+              <a:latin typeface="Baskervald ADF Std" pitchFamily="18" charset="0"/>
+            </a:endParaRPr>
           </a:p>
         </p:txBody>
       </p:sp>
@@ -6781,7 +6819,9 @@
           <a:lstStyle/>
           <a:p>
             <a:pPr algn="ctr"/>
-            <a:endParaRPr lang="en-US" dirty="0"/>
+            <a:endParaRPr lang="en-US" dirty="0">
+              <a:latin typeface="Baskervald ADF Std" pitchFamily="18" charset="0"/>
+            </a:endParaRPr>
           </a:p>
         </p:txBody>
       </p:sp>
@@ -6829,7 +6869,9 @@
           <a:lstStyle/>
           <a:p>
             <a:pPr algn="ctr"/>
-            <a:endParaRPr lang="en-US" dirty="0"/>
+            <a:endParaRPr lang="en-US" dirty="0">
+              <a:latin typeface="Baskervald ADF Std" pitchFamily="18" charset="0"/>
+            </a:endParaRPr>
           </a:p>
         </p:txBody>
       </p:sp>
@@ -6877,7 +6919,9 @@
           <a:lstStyle/>
           <a:p>
             <a:pPr algn="ctr"/>
-            <a:endParaRPr lang="en-US" dirty="0"/>
+            <a:endParaRPr lang="en-US" dirty="0">
+              <a:latin typeface="Baskervald ADF Std" pitchFamily="18" charset="0"/>
+            </a:endParaRPr>
           </a:p>
         </p:txBody>
       </p:sp>
@@ -6925,7 +6969,9 @@
           <a:lstStyle/>
           <a:p>
             <a:pPr algn="ctr"/>
-            <a:endParaRPr lang="en-US" dirty="0"/>
+            <a:endParaRPr lang="en-US" dirty="0">
+              <a:latin typeface="Baskervald ADF Std" pitchFamily="18" charset="0"/>
+            </a:endParaRPr>
           </a:p>
         </p:txBody>
       </p:sp>
@@ -6973,7 +7019,9 @@
           <a:lstStyle/>
           <a:p>
             <a:pPr algn="ctr"/>
-            <a:endParaRPr lang="en-US" dirty="0"/>
+            <a:endParaRPr lang="en-US" dirty="0">
+              <a:latin typeface="Baskervald ADF Std" pitchFamily="18" charset="0"/>
+            </a:endParaRPr>
           </a:p>
         </p:txBody>
       </p:sp>
@@ -7021,7 +7069,9 @@
           <a:lstStyle/>
           <a:p>
             <a:pPr algn="ctr"/>
-            <a:endParaRPr lang="en-US" dirty="0"/>
+            <a:endParaRPr lang="en-US" dirty="0">
+              <a:latin typeface="Baskervald ADF Std" pitchFamily="18" charset="0"/>
+            </a:endParaRPr>
           </a:p>
         </p:txBody>
       </p:sp>
@@ -7069,7 +7119,9 @@
           <a:lstStyle/>
           <a:p>
             <a:pPr algn="ctr"/>
-            <a:endParaRPr lang="en-US" dirty="0"/>
+            <a:endParaRPr lang="en-US" dirty="0">
+              <a:latin typeface="Baskervald ADF Std" pitchFamily="18" charset="0"/>
+            </a:endParaRPr>
           </a:p>
         </p:txBody>
       </p:sp>
@@ -7117,7 +7169,9 @@
           <a:lstStyle/>
           <a:p>
             <a:pPr algn="ctr"/>
-            <a:endParaRPr lang="en-US" dirty="0"/>
+            <a:endParaRPr lang="en-US" dirty="0">
+              <a:latin typeface="Baskervald ADF Std" pitchFamily="18" charset="0"/>
+            </a:endParaRPr>
           </a:p>
         </p:txBody>
       </p:sp>
@@ -7165,7 +7219,9 @@
           <a:lstStyle/>
           <a:p>
             <a:pPr algn="ctr"/>
-            <a:endParaRPr lang="en-US" dirty="0"/>
+            <a:endParaRPr lang="en-US" dirty="0">
+              <a:latin typeface="Baskervald ADF Std" pitchFamily="18" charset="0"/>
+            </a:endParaRPr>
           </a:p>
         </p:txBody>
       </p:sp>
@@ -7213,7 +7269,9 @@
           <a:lstStyle/>
           <a:p>
             <a:pPr algn="ctr"/>
-            <a:endParaRPr lang="en-US" dirty="0"/>
+            <a:endParaRPr lang="en-US" dirty="0">
+              <a:latin typeface="Baskervald ADF Std" pitchFamily="18" charset="0"/>
+            </a:endParaRPr>
           </a:p>
         </p:txBody>
       </p:sp>
@@ -7261,7 +7319,9 @@
           <a:lstStyle/>
           <a:p>
             <a:pPr algn="ctr"/>
-            <a:endParaRPr lang="en-US" dirty="0"/>
+            <a:endParaRPr lang="en-US" dirty="0">
+              <a:latin typeface="Baskervald ADF Std" pitchFamily="18" charset="0"/>
+            </a:endParaRPr>
           </a:p>
         </p:txBody>
       </p:sp>
@@ -7309,7 +7369,9 @@
           <a:lstStyle/>
           <a:p>
             <a:pPr algn="ctr"/>
-            <a:endParaRPr lang="en-US" dirty="0"/>
+            <a:endParaRPr lang="en-US" dirty="0">
+              <a:latin typeface="Baskervald ADF Std" pitchFamily="18" charset="0"/>
+            </a:endParaRPr>
           </a:p>
         </p:txBody>
       </p:sp>
@@ -7357,7 +7419,9 @@
           <a:lstStyle/>
           <a:p>
             <a:pPr algn="ctr"/>
-            <a:endParaRPr lang="en-US" dirty="0"/>
+            <a:endParaRPr lang="en-US" dirty="0">
+              <a:latin typeface="Baskervald ADF Std" pitchFamily="18" charset="0"/>
+            </a:endParaRPr>
           </a:p>
         </p:txBody>
       </p:sp>
@@ -7405,7 +7469,9 @@
           <a:lstStyle/>
           <a:p>
             <a:pPr algn="ctr"/>
-            <a:endParaRPr lang="en-US" dirty="0"/>
+            <a:endParaRPr lang="en-US" dirty="0">
+              <a:latin typeface="Baskervald ADF Std" pitchFamily="18" charset="0"/>
+            </a:endParaRPr>
           </a:p>
         </p:txBody>
       </p:sp>
@@ -7453,7 +7519,9 @@
           <a:lstStyle/>
           <a:p>
             <a:pPr algn="ctr"/>
-            <a:endParaRPr lang="en-US" dirty="0"/>
+            <a:endParaRPr lang="en-US" dirty="0">
+              <a:latin typeface="Baskervald ADF Std" pitchFamily="18" charset="0"/>
+            </a:endParaRPr>
           </a:p>
         </p:txBody>
       </p:sp>
@@ -7480,24 +7548,34 @@
           <a:lstStyle/>
           <a:p>
             <a:r>
-              <a:rPr lang="en-US" sz="1400" dirty="0" smtClean="0"/>
+              <a:rPr lang="en-US" sz="1400" dirty="0" smtClean="0">
+                <a:latin typeface="Baskervald ADF Std" pitchFamily="18" charset="0"/>
+              </a:rPr>
               <a:t>Pr(hand | data) = P</a:t>
             </a:r>
             <a:r>
-              <a:rPr lang="en-US" sz="1400" baseline="-25000" dirty="0" smtClean="0"/>
+              <a:rPr lang="en-US" sz="1400" baseline="-25000" dirty="0" smtClean="0">
+                <a:latin typeface="Baskervald ADF Std" pitchFamily="18" charset="0"/>
+              </a:rPr>
               <a:t>1</a:t>
             </a:r>
           </a:p>
           <a:p>
             <a:r>
-              <a:rPr lang="en-US" sz="1400" dirty="0" smtClean="0"/>
+              <a:rPr lang="en-US" sz="1400" dirty="0" smtClean="0">
+                <a:latin typeface="Baskervald ADF Std" pitchFamily="18" charset="0"/>
+              </a:rPr>
               <a:t>Pr(!hand | data) = P</a:t>
             </a:r>
             <a:r>
-              <a:rPr lang="en-US" sz="1400" baseline="-25000" dirty="0" smtClean="0"/>
+              <a:rPr lang="en-US" sz="1400" baseline="-25000" dirty="0" smtClean="0">
+                <a:latin typeface="Baskervald ADF Std" pitchFamily="18" charset="0"/>
+              </a:rPr>
               <a:t>2</a:t>
             </a:r>
-            <a:endParaRPr lang="en-US" sz="1400" baseline="-25000" dirty="0"/>
+            <a:endParaRPr lang="en-US" sz="1400" baseline="-25000" dirty="0">
+              <a:latin typeface="Baskervald ADF Std" pitchFamily="18" charset="0"/>
+            </a:endParaRPr>
           </a:p>
         </p:txBody>
       </p:sp>
@@ -7524,24 +7602,34 @@
           <a:lstStyle/>
           <a:p>
             <a:r>
-              <a:rPr lang="en-US" sz="1400" dirty="0" smtClean="0"/>
+              <a:rPr lang="en-US" sz="1400" dirty="0" smtClean="0">
+                <a:latin typeface="Baskervald ADF Std" pitchFamily="18" charset="0"/>
+              </a:rPr>
               <a:t>Pr(hand | data) = P</a:t>
             </a:r>
             <a:r>
-              <a:rPr lang="en-US" sz="1400" baseline="-25000" dirty="0" smtClean="0"/>
+              <a:rPr lang="en-US" sz="1400" baseline="-25000" dirty="0" smtClean="0">
+                <a:latin typeface="Baskervald ADF Std" pitchFamily="18" charset="0"/>
+              </a:rPr>
               <a:t>3</a:t>
             </a:r>
           </a:p>
           <a:p>
             <a:r>
-              <a:rPr lang="en-US" sz="1400" dirty="0" smtClean="0"/>
+              <a:rPr lang="en-US" sz="1400" dirty="0" smtClean="0">
+                <a:latin typeface="Baskervald ADF Std" pitchFamily="18" charset="0"/>
+              </a:rPr>
               <a:t>Pr(!hand | data) = P</a:t>
             </a:r>
             <a:r>
-              <a:rPr lang="en-US" sz="1400" baseline="-25000" dirty="0" smtClean="0"/>
+              <a:rPr lang="en-US" sz="1400" baseline="-25000" dirty="0" smtClean="0">
+                <a:latin typeface="Baskervald ADF Std" pitchFamily="18" charset="0"/>
+              </a:rPr>
               <a:t>4</a:t>
             </a:r>
-            <a:endParaRPr lang="en-US" sz="1400" baseline="-25000" dirty="0"/>
+            <a:endParaRPr lang="en-US" sz="1400" baseline="-25000" dirty="0">
+              <a:latin typeface="Baskervald ADF Std" pitchFamily="18" charset="0"/>
+            </a:endParaRPr>
           </a:p>
         </p:txBody>
       </p:sp>
@@ -7568,10 +7656,14 @@
           <a:lstStyle/>
           <a:p>
             <a:r>
-              <a:rPr lang="en-US" sz="2000" dirty="0" smtClean="0"/>
+              <a:rPr lang="en-US" sz="2000" dirty="0" smtClean="0">
+                <a:latin typeface="Baskervald ADF Std" pitchFamily="18" charset="0"/>
+              </a:rPr>
               <a:t>RDT1</a:t>
             </a:r>
-            <a:endParaRPr lang="en-US" sz="2000" baseline="-25000" dirty="0"/>
+            <a:endParaRPr lang="en-US" sz="2000" baseline="-25000" dirty="0">
+              <a:latin typeface="Baskervald ADF Std" pitchFamily="18" charset="0"/>
+            </a:endParaRPr>
           </a:p>
         </p:txBody>
       </p:sp>
@@ -7598,10 +7690,14 @@
           <a:lstStyle/>
           <a:p>
             <a:r>
-              <a:rPr lang="en-US" sz="2000" dirty="0" smtClean="0"/>
+              <a:rPr lang="en-US" sz="2000" dirty="0" smtClean="0">
+                <a:latin typeface="Baskervald ADF Std" pitchFamily="18" charset="0"/>
+              </a:rPr>
               <a:t>RDT2</a:t>
             </a:r>
-            <a:endParaRPr lang="en-US" sz="2000" baseline="-25000" dirty="0"/>
+            <a:endParaRPr lang="en-US" sz="2000" baseline="-25000" dirty="0">
+              <a:latin typeface="Baskervald ADF Std" pitchFamily="18" charset="0"/>
+            </a:endParaRPr>
           </a:p>
         </p:txBody>
       </p:sp>
@@ -7739,133 +7835,199 @@
           <a:lstStyle/>
           <a:p>
             <a:r>
-              <a:rPr lang="en-US" sz="1400" dirty="0" smtClean="0"/>
+              <a:rPr lang="en-US" sz="1400" dirty="0" smtClean="0">
+                <a:latin typeface="Baskervald ADF Std" pitchFamily="18" charset="0"/>
+              </a:rPr>
               <a:t>Pr(hand | data) ≈ (P</a:t>
             </a:r>
             <a:r>
-              <a:rPr lang="en-US" sz="1400" baseline="-25000" dirty="0" smtClean="0"/>
+              <a:rPr lang="en-US" sz="1400" baseline="-25000" dirty="0" smtClean="0">
+                <a:latin typeface="Baskervald ADF Std" pitchFamily="18" charset="0"/>
+              </a:rPr>
               <a:t>1</a:t>
             </a:r>
             <a:r>
-              <a:rPr lang="en-US" sz="1400" dirty="0" smtClean="0"/>
+              <a:rPr lang="en-US" sz="1400" dirty="0" smtClean="0">
+                <a:latin typeface="Baskervald ADF Std" pitchFamily="18" charset="0"/>
+              </a:rPr>
               <a:t>+P</a:t>
             </a:r>
             <a:r>
-              <a:rPr lang="en-US" sz="1400" baseline="-25000" dirty="0" smtClean="0"/>
+              <a:rPr lang="en-US" sz="1400" baseline="-25000" dirty="0" smtClean="0">
+                <a:latin typeface="Baskervald ADF Std" pitchFamily="18" charset="0"/>
+              </a:rPr>
               <a:t>3</a:t>
             </a:r>
             <a:r>
-              <a:rPr lang="en-US" sz="1400" dirty="0" smtClean="0"/>
+              <a:rPr lang="en-US" sz="1400" dirty="0" smtClean="0">
+                <a:latin typeface="Baskervald ADF Std" pitchFamily="18" charset="0"/>
+              </a:rPr>
               <a:t>) / (P</a:t>
             </a:r>
             <a:r>
-              <a:rPr lang="en-US" sz="1400" baseline="-25000" dirty="0" smtClean="0"/>
+              <a:rPr lang="en-US" sz="1400" baseline="-25000" dirty="0" smtClean="0">
+                <a:latin typeface="Baskervald ADF Std" pitchFamily="18" charset="0"/>
+              </a:rPr>
               <a:t>1</a:t>
             </a:r>
             <a:r>
-              <a:rPr lang="en-US" sz="1400" dirty="0" smtClean="0"/>
+              <a:rPr lang="en-US" sz="1400" dirty="0" smtClean="0">
+                <a:latin typeface="Baskervald ADF Std" pitchFamily="18" charset="0"/>
+              </a:rPr>
               <a:t> + P</a:t>
             </a:r>
             <a:r>
-              <a:rPr lang="en-US" sz="1400" baseline="-25000" dirty="0" smtClean="0"/>
+              <a:rPr lang="en-US" sz="1400" baseline="-25000" dirty="0" smtClean="0">
+                <a:latin typeface="Baskervald ADF Std" pitchFamily="18" charset="0"/>
+              </a:rPr>
               <a:t>2</a:t>
             </a:r>
             <a:r>
-              <a:rPr lang="en-US" sz="1400" dirty="0" smtClean="0"/>
+              <a:rPr lang="en-US" sz="1400" dirty="0" smtClean="0">
+                <a:latin typeface="Baskervald ADF Std" pitchFamily="18" charset="0"/>
+              </a:rPr>
               <a:t> + P</a:t>
             </a:r>
             <a:r>
-              <a:rPr lang="en-US" sz="1400" baseline="-25000" dirty="0" smtClean="0"/>
+              <a:rPr lang="en-US" sz="1400" baseline="-25000" dirty="0" smtClean="0">
+                <a:latin typeface="Baskervald ADF Std" pitchFamily="18" charset="0"/>
+              </a:rPr>
               <a:t>3</a:t>
             </a:r>
             <a:r>
-              <a:rPr lang="en-US" sz="1400" dirty="0" smtClean="0"/>
+              <a:rPr lang="en-US" sz="1400" dirty="0" smtClean="0">
+                <a:latin typeface="Baskervald ADF Std" pitchFamily="18" charset="0"/>
+              </a:rPr>
               <a:t> + P</a:t>
             </a:r>
             <a:r>
-              <a:rPr lang="en-US" sz="1400" baseline="-25000" dirty="0" smtClean="0"/>
+              <a:rPr lang="en-US" sz="1400" baseline="-25000" dirty="0" smtClean="0">
+                <a:latin typeface="Baskervald ADF Std" pitchFamily="18" charset="0"/>
+              </a:rPr>
               <a:t>4</a:t>
             </a:r>
             <a:r>
-              <a:rPr lang="en-US" sz="1400" dirty="0" smtClean="0"/>
+              <a:rPr lang="en-US" sz="1400" dirty="0" smtClean="0">
+                <a:latin typeface="Baskervald ADF Std" pitchFamily="18" charset="0"/>
+              </a:rPr>
               <a:t>)</a:t>
             </a:r>
-            <a:endParaRPr lang="en-US" sz="1400" baseline="-25000" dirty="0" smtClean="0"/>
+            <a:endParaRPr lang="en-US" sz="1400" baseline="-25000" dirty="0" smtClean="0">
+              <a:latin typeface="Baskervald ADF Std" pitchFamily="18" charset="0"/>
+            </a:endParaRPr>
           </a:p>
           <a:p>
             <a:r>
-              <a:rPr lang="en-US" sz="1400" dirty="0" smtClean="0"/>
+              <a:rPr lang="en-US" sz="1400" dirty="0" smtClean="0">
+                <a:latin typeface="Baskervald ADF Std" pitchFamily="18" charset="0"/>
+              </a:rPr>
               <a:t>Pr(!hand | data</a:t>
             </a:r>
             <a:r>
-              <a:rPr lang="en-US" sz="1400" dirty="0"/>
+              <a:rPr lang="en-US" sz="1400" dirty="0">
+                <a:latin typeface="Baskervald ADF Std" pitchFamily="18" charset="0"/>
+              </a:rPr>
               <a:t>) ≈</a:t>
             </a:r>
             <a:r>
-              <a:rPr lang="en-US" sz="1400" dirty="0" smtClean="0"/>
+              <a:rPr lang="en-US" sz="1400" dirty="0" smtClean="0">
+                <a:latin typeface="Baskervald ADF Std" pitchFamily="18" charset="0"/>
+              </a:rPr>
               <a:t> </a:t>
             </a:r>
             <a:r>
-              <a:rPr lang="en-US" sz="1400" dirty="0"/>
+              <a:rPr lang="en-US" sz="1400" dirty="0">
+                <a:latin typeface="Baskervald ADF Std" pitchFamily="18" charset="0"/>
+              </a:rPr>
               <a:t>(</a:t>
             </a:r>
             <a:r>
-              <a:rPr lang="en-US" sz="1400" dirty="0" smtClean="0"/>
+              <a:rPr lang="en-US" sz="1400" dirty="0" smtClean="0">
+                <a:latin typeface="Baskervald ADF Std" pitchFamily="18" charset="0"/>
+              </a:rPr>
               <a:t>P</a:t>
             </a:r>
             <a:r>
-              <a:rPr lang="en-US" sz="1400" baseline="-25000" dirty="0" smtClean="0"/>
+              <a:rPr lang="en-US" sz="1400" baseline="-25000" dirty="0" smtClean="0">
+                <a:latin typeface="Baskervald ADF Std" pitchFamily="18" charset="0"/>
+              </a:rPr>
               <a:t>2</a:t>
             </a:r>
             <a:r>
-              <a:rPr lang="en-US" sz="1400" dirty="0" smtClean="0"/>
+              <a:rPr lang="en-US" sz="1400" dirty="0" smtClean="0">
+                <a:latin typeface="Baskervald ADF Std" pitchFamily="18" charset="0"/>
+              </a:rPr>
               <a:t>+P</a:t>
             </a:r>
             <a:r>
-              <a:rPr lang="en-US" sz="1400" baseline="-25000" dirty="0"/>
+              <a:rPr lang="en-US" sz="1400" baseline="-25000" dirty="0">
+                <a:latin typeface="Baskervald ADF Std" pitchFamily="18" charset="0"/>
+              </a:rPr>
               <a:t>4</a:t>
             </a:r>
             <a:r>
-              <a:rPr lang="en-US" sz="1400" dirty="0" smtClean="0"/>
+              <a:rPr lang="en-US" sz="1400" dirty="0" smtClean="0">
+                <a:latin typeface="Baskervald ADF Std" pitchFamily="18" charset="0"/>
+              </a:rPr>
               <a:t>) </a:t>
             </a:r>
             <a:r>
-              <a:rPr lang="en-US" sz="1400" dirty="0"/>
+              <a:rPr lang="en-US" sz="1400" dirty="0">
+                <a:latin typeface="Baskervald ADF Std" pitchFamily="18" charset="0"/>
+              </a:rPr>
               <a:t>/ (P</a:t>
             </a:r>
             <a:r>
-              <a:rPr lang="en-US" sz="1400" baseline="-25000" dirty="0"/>
+              <a:rPr lang="en-US" sz="1400" baseline="-25000" dirty="0">
+                <a:latin typeface="Baskervald ADF Std" pitchFamily="18" charset="0"/>
+              </a:rPr>
               <a:t>1</a:t>
             </a:r>
             <a:r>
-              <a:rPr lang="en-US" sz="1400" dirty="0"/>
+              <a:rPr lang="en-US" sz="1400" dirty="0">
+                <a:latin typeface="Baskervald ADF Std" pitchFamily="18" charset="0"/>
+              </a:rPr>
               <a:t> + P</a:t>
             </a:r>
             <a:r>
-              <a:rPr lang="en-US" sz="1400" baseline="-25000" dirty="0"/>
+              <a:rPr lang="en-US" sz="1400" baseline="-25000" dirty="0">
+                <a:latin typeface="Baskervald ADF Std" pitchFamily="18" charset="0"/>
+              </a:rPr>
               <a:t>2</a:t>
             </a:r>
             <a:r>
-              <a:rPr lang="en-US" sz="1400" dirty="0"/>
+              <a:rPr lang="en-US" sz="1400" dirty="0">
+                <a:latin typeface="Baskervald ADF Std" pitchFamily="18" charset="0"/>
+              </a:rPr>
               <a:t> + P</a:t>
             </a:r>
             <a:r>
-              <a:rPr lang="en-US" sz="1400" baseline="-25000" dirty="0"/>
+              <a:rPr lang="en-US" sz="1400" baseline="-25000" dirty="0">
+                <a:latin typeface="Baskervald ADF Std" pitchFamily="18" charset="0"/>
+              </a:rPr>
               <a:t>3</a:t>
             </a:r>
             <a:r>
-              <a:rPr lang="en-US" sz="1400" dirty="0"/>
+              <a:rPr lang="en-US" sz="1400" dirty="0">
+                <a:latin typeface="Baskervald ADF Std" pitchFamily="18" charset="0"/>
+              </a:rPr>
               <a:t> + P</a:t>
             </a:r>
             <a:r>
-              <a:rPr lang="en-US" sz="1400" baseline="-25000" dirty="0"/>
+              <a:rPr lang="en-US" sz="1400" baseline="-25000" dirty="0">
+                <a:latin typeface="Baskervald ADF Std" pitchFamily="18" charset="0"/>
+              </a:rPr>
               <a:t>4</a:t>
             </a:r>
             <a:r>
-              <a:rPr lang="en-US" sz="1400" dirty="0"/>
+              <a:rPr lang="en-US" sz="1400" dirty="0">
+                <a:latin typeface="Baskervald ADF Std" pitchFamily="18" charset="0"/>
+              </a:rPr>
               <a:t>)</a:t>
             </a:r>
-            <a:endParaRPr lang="en-US" sz="1400" baseline="-25000" dirty="0"/>
+            <a:endParaRPr lang="en-US" sz="1400" baseline="-25000" dirty="0">
+              <a:latin typeface="Baskervald ADF Std" pitchFamily="18" charset="0"/>
+            </a:endParaRPr>
           </a:p>
         </p:txBody>
       </p:sp>
@@ -8024,10 +8186,14 @@
           <a:p>
             <a:pPr algn="ctr"/>
             <a:r>
-              <a:rPr lang="en-US" dirty="0" smtClean="0"/>
+              <a:rPr lang="en-US" dirty="0" smtClean="0">
+                <a:latin typeface="Baskervald ADF Std" pitchFamily="18" charset="0"/>
+              </a:rPr>
               <a:t>Target Labeling</a:t>
             </a:r>
-            <a:endParaRPr lang="en-US" dirty="0"/>
+            <a:endParaRPr lang="en-US" dirty="0">
+              <a:latin typeface="Baskervald ADF Std" pitchFamily="18" charset="0"/>
+            </a:endParaRPr>
           </a:p>
         </p:txBody>
       </p:sp>
@@ -8055,10 +8221,14 @@
           <a:p>
             <a:pPr algn="ctr"/>
             <a:r>
-              <a:rPr lang="en-US" dirty="0" smtClean="0"/>
+              <a:rPr lang="en-US" dirty="0" smtClean="0">
+                <a:latin typeface="Baskervald ADF Std" pitchFamily="18" charset="0"/>
+              </a:rPr>
               <a:t>Trained RDF Labeling</a:t>
             </a:r>
-            <a:endParaRPr lang="en-US" dirty="0"/>
+            <a:endParaRPr lang="en-US" dirty="0">
+              <a:latin typeface="Baskervald ADF Std" pitchFamily="18" charset="0"/>
+            </a:endParaRPr>
           </a:p>
         </p:txBody>
       </p:sp>
@@ -8299,10 +8469,14 @@
           <a:lstStyle/>
           <a:p>
             <a:r>
-              <a:rPr lang="en-US" dirty="0" smtClean="0"/>
+              <a:rPr lang="en-US" dirty="0" smtClean="0">
+                <a:latin typeface="Baskervald ADF Std" pitchFamily="18" charset="0"/>
+              </a:rPr>
               <a:t>PrimeSense</a:t>
             </a:r>
-            <a:endParaRPr lang="en-US" dirty="0"/>
+            <a:endParaRPr lang="en-US" dirty="0">
+              <a:latin typeface="Baskervald ADF Std" pitchFamily="18" charset="0"/>
+            </a:endParaRPr>
           </a:p>
         </p:txBody>
       </p:sp>
@@ -8329,10 +8503,14 @@
           <a:lstStyle/>
           <a:p>
             <a:r>
-              <a:rPr lang="en-US" dirty="0" smtClean="0"/>
+              <a:rPr lang="en-US" dirty="0" smtClean="0">
+                <a:latin typeface="Baskervald ADF Std" pitchFamily="18" charset="0"/>
+              </a:rPr>
               <a:t>synthetic</a:t>
             </a:r>
-            <a:endParaRPr lang="en-US" dirty="0"/>
+            <a:endParaRPr lang="en-US" dirty="0">
+              <a:latin typeface="Baskervald ADF Std" pitchFamily="18" charset="0"/>
+            </a:endParaRPr>
           </a:p>
         </p:txBody>
       </p:sp>
@@ -8359,10 +8537,14 @@
           <a:lstStyle/>
           <a:p>
             <a:r>
-              <a:rPr lang="en-US" dirty="0" smtClean="0"/>
+              <a:rPr lang="en-US" dirty="0" smtClean="0">
+                <a:latin typeface="Baskervald ADF Std" pitchFamily="18" charset="0"/>
+              </a:rPr>
               <a:t>residue</a:t>
             </a:r>
-            <a:endParaRPr lang="en-US" dirty="0"/>
+            <a:endParaRPr lang="en-US" dirty="0">
+              <a:latin typeface="Baskervald ADF Std" pitchFamily="18" charset="0"/>
+            </a:endParaRPr>
           </a:p>
         </p:txBody>
       </p:sp>
@@ -9037,47 +9219,63 @@
           <a:p>
             <a:pPr eaLnBrk="1" hangingPunct="1"/>
             <a:r>
-              <a:rPr lang="en-US" sz="2000" dirty="0" smtClean="0"/>
+              <a:rPr lang="en-US" sz="2000" dirty="0" smtClean="0">
+                <a:latin typeface="Baskervald ADF Std" pitchFamily="18" charset="0"/>
+              </a:rPr>
               <a:t>6 DOF</a:t>
             </a:r>
           </a:p>
           <a:p>
             <a:pPr eaLnBrk="1" hangingPunct="1"/>
             <a:r>
-              <a:rPr lang="en-US" sz="2000" dirty="0"/>
+              <a:rPr lang="en-US" sz="2000" dirty="0">
+                <a:latin typeface="Baskervald ADF Std" pitchFamily="18" charset="0"/>
+              </a:rPr>
               <a:t>3</a:t>
             </a:r>
             <a:r>
-              <a:rPr lang="en-US" sz="2000" dirty="0" smtClean="0"/>
+              <a:rPr lang="en-US" sz="2000" dirty="0" smtClean="0">
+                <a:latin typeface="Baskervald ADF Std" pitchFamily="18" charset="0"/>
+              </a:rPr>
               <a:t> DOF</a:t>
             </a:r>
           </a:p>
           <a:p>
             <a:pPr eaLnBrk="1" hangingPunct="1"/>
             <a:r>
-              <a:rPr lang="en-US" sz="2000" dirty="0"/>
+              <a:rPr lang="en-US" sz="2000" dirty="0">
+                <a:latin typeface="Baskervald ADF Std" pitchFamily="18" charset="0"/>
+              </a:rPr>
               <a:t>2</a:t>
             </a:r>
             <a:r>
-              <a:rPr lang="en-US" sz="2000" dirty="0" smtClean="0"/>
+              <a:rPr lang="en-US" sz="2000" dirty="0" smtClean="0">
+                <a:latin typeface="Baskervald ADF Std" pitchFamily="18" charset="0"/>
+              </a:rPr>
               <a:t> DOF</a:t>
             </a:r>
           </a:p>
           <a:p>
             <a:pPr eaLnBrk="1" hangingPunct="1"/>
             <a:r>
-              <a:rPr lang="en-US" sz="2000" dirty="0" smtClean="0"/>
+              <a:rPr lang="en-US" sz="2000" dirty="0" smtClean="0">
+                <a:latin typeface="Baskervald ADF Std" pitchFamily="18" charset="0"/>
+              </a:rPr>
               <a:t>1 </a:t>
             </a:r>
             <a:r>
-              <a:rPr lang="en-US" sz="2000" dirty="0"/>
+              <a:rPr lang="en-US" sz="2000" dirty="0">
+                <a:latin typeface="Baskervald ADF Std" pitchFamily="18" charset="0"/>
+              </a:rPr>
               <a:t>DOF</a:t>
             </a:r>
           </a:p>
           <a:p>
             <a:pPr eaLnBrk="1" hangingPunct="1"/>
             <a:r>
-              <a:rPr lang="en-US" sz="2000" dirty="0"/>
+              <a:rPr lang="en-US" sz="2000" dirty="0">
+                <a:latin typeface="Baskervald ADF Std" pitchFamily="18" charset="0"/>
+              </a:rPr>
               <a:t>     </a:t>
             </a:r>
           </a:p>
@@ -11047,7 +11245,9 @@
             <a:pPr algn="ctr">
               <a:defRPr/>
             </a:pPr>
-            <a:endParaRPr lang="en-US" dirty="0"/>
+            <a:endParaRPr lang="en-US" dirty="0">
+              <a:latin typeface="Baskervald ADF Std" pitchFamily="18" charset="0"/>
+            </a:endParaRPr>
           </a:p>
         </p:txBody>
       </p:sp>
@@ -11099,6 +11299,7 @@
                 <a:solidFill>
                   <a:schemeClr val="tx1"/>
                 </a:solidFill>
+                <a:latin typeface="Baskervald ADF Std" pitchFamily="18" charset="0"/>
               </a:rPr>
               <a:t>Render Hypothesis</a:t>
             </a:r>
@@ -11153,6 +11354,7 @@
                 <a:solidFill>
                   <a:schemeClr val="tx1"/>
                 </a:solidFill>
+                <a:latin typeface="Baskervald ADF Std" pitchFamily="18" charset="0"/>
               </a:rPr>
               <a:t>Evaluate Fit</a:t>
             </a:r>
@@ -11207,6 +11409,7 @@
                 <a:solidFill>
                   <a:schemeClr val="tx1"/>
                 </a:solidFill>
+                <a:latin typeface="Baskervald ADF Std" pitchFamily="18" charset="0"/>
               </a:rPr>
               <a:t>Adjust Hypothesis</a:t>
             </a:r>
@@ -11299,6 +11502,7 @@
                 <a:solidFill>
                   <a:schemeClr val="tx1"/>
                 </a:solidFill>
+                <a:latin typeface="Baskervald ADF Std" pitchFamily="18" charset="0"/>
               </a:rPr>
               <a:t>Check Termination</a:t>
             </a:r>
@@ -11471,6 +11675,7 @@
                 <a:solidFill>
                   <a:srgbClr val="FF0000"/>
                 </a:solidFill>
+                <a:latin typeface="Baskervald ADF Std" pitchFamily="18" charset="0"/>
               </a:rPr>
               <a:t>PSO</a:t>
             </a:r>
@@ -11484,6 +11689,7 @@
                 <a:solidFill>
                   <a:schemeClr val="tx1"/>
                 </a:solidFill>
+                <a:latin typeface="Baskervald ADF Std" pitchFamily="18" charset="0"/>
               </a:rPr>
               <a:t>search space coverage</a:t>
             </a:r>
@@ -11578,6 +11784,7 @@
                 <a:solidFill>
                   <a:srgbClr val="FF0000"/>
                 </a:solidFill>
+                <a:latin typeface="Baskervald ADF Std" pitchFamily="18" charset="0"/>
               </a:rPr>
               <a:t>Nelder-Mead</a:t>
             </a:r>
@@ -11591,6 +11798,7 @@
                 <a:solidFill>
                   <a:schemeClr val="tx1"/>
                 </a:solidFill>
+                <a:latin typeface="Baskervald ADF Std" pitchFamily="18" charset="0"/>
               </a:rPr>
               <a:t>Fast local convergence</a:t>
             </a:r>
@@ -11756,6 +11964,7 @@
                 <a:solidFill>
                   <a:srgbClr val="FF0000"/>
                 </a:solidFill>
+                <a:latin typeface="Baskervald ADF Std" pitchFamily="18" charset="0"/>
               </a:rPr>
               <a:t>CNN Feature Detector 1</a:t>
             </a:r>
@@ -11763,6 +11972,7 @@
               <a:solidFill>
                 <a:schemeClr val="tx1"/>
               </a:solidFill>
+              <a:latin typeface="Baskervald ADF Std" pitchFamily="18" charset="0"/>
             </a:endParaRPr>
           </a:p>
         </p:txBody>
@@ -11817,6 +12027,7 @@
                 <a:solidFill>
                   <a:srgbClr val="FF0000"/>
                 </a:solidFill>
+                <a:latin typeface="Baskervald ADF Std" pitchFamily="18" charset="0"/>
               </a:rPr>
               <a:t>CNN Feature Detector 2</a:t>
             </a:r>
@@ -11824,6 +12035,7 @@
               <a:solidFill>
                 <a:schemeClr val="tx1"/>
               </a:solidFill>
+              <a:latin typeface="Baskervald ADF Std" pitchFamily="18" charset="0"/>
             </a:endParaRPr>
           </a:p>
         </p:txBody>
@@ -11878,6 +12090,7 @@
                 <a:solidFill>
                   <a:srgbClr val="FF0000"/>
                 </a:solidFill>
+                <a:latin typeface="Baskervald ADF Std" pitchFamily="18" charset="0"/>
               </a:rPr>
               <a:t>CNN Feature Detector 3</a:t>
             </a:r>
@@ -11885,6 +12098,7 @@
               <a:solidFill>
                 <a:schemeClr val="tx1"/>
               </a:solidFill>
+              <a:latin typeface="Baskervald ADF Std" pitchFamily="18" charset="0"/>
             </a:endParaRPr>
           </a:p>
         </p:txBody>
@@ -11939,6 +12153,7 @@
                 <a:solidFill>
                   <a:srgbClr val="FF0000"/>
                 </a:solidFill>
+                <a:latin typeface="Baskervald ADF Std" pitchFamily="18" charset="0"/>
               </a:rPr>
               <a:t>Image Preprocessing</a:t>
             </a:r>
@@ -11946,6 +12161,7 @@
               <a:solidFill>
                 <a:schemeClr val="tx1"/>
               </a:solidFill>
+              <a:latin typeface="Baskervald ADF Std" pitchFamily="18" charset="0"/>
             </a:endParaRPr>
           </a:p>
         </p:txBody>
@@ -12119,6 +12335,7 @@
               <a:solidFill>
                 <a:schemeClr val="tx1"/>
               </a:solidFill>
+              <a:latin typeface="Baskervald ADF Std" pitchFamily="18" charset="0"/>
             </a:endParaRPr>
           </a:p>
         </p:txBody>
@@ -12159,7 +12376,9 @@
           <a:lstStyle/>
           <a:p>
             <a:pPr algn="ctr"/>
-            <a:endParaRPr lang="en-US" dirty="0"/>
+            <a:endParaRPr lang="en-US" dirty="0">
+              <a:latin typeface="Baskervald ADF Std" pitchFamily="18" charset="0"/>
+            </a:endParaRPr>
           </a:p>
         </p:txBody>
       </p:sp>
@@ -12199,7 +12418,9 @@
           <a:lstStyle/>
           <a:p>
             <a:pPr algn="ctr"/>
-            <a:endParaRPr lang="en-US" dirty="0"/>
+            <a:endParaRPr lang="en-US" dirty="0">
+              <a:latin typeface="Baskervald ADF Std" pitchFamily="18" charset="0"/>
+            </a:endParaRPr>
           </a:p>
         </p:txBody>
       </p:sp>
@@ -12239,7 +12460,9 @@
           <a:lstStyle/>
           <a:p>
             <a:pPr algn="ctr"/>
-            <a:endParaRPr lang="en-US" dirty="0"/>
+            <a:endParaRPr lang="en-US" dirty="0">
+              <a:latin typeface="Baskervald ADF Std" pitchFamily="18" charset="0"/>
+            </a:endParaRPr>
           </a:p>
         </p:txBody>
       </p:sp>
@@ -12279,7 +12502,9 @@
           <a:lstStyle/>
           <a:p>
             <a:pPr algn="ctr"/>
-            <a:endParaRPr lang="en-US" dirty="0"/>
+            <a:endParaRPr lang="en-US" dirty="0">
+              <a:latin typeface="Baskervald ADF Std" pitchFamily="18" charset="0"/>
+            </a:endParaRPr>
           </a:p>
         </p:txBody>
       </p:sp>
@@ -12319,7 +12544,9 @@
           <a:lstStyle/>
           <a:p>
             <a:pPr algn="ctr"/>
-            <a:endParaRPr lang="en-US" dirty="0"/>
+            <a:endParaRPr lang="en-US" dirty="0">
+              <a:latin typeface="Baskervald ADF Std" pitchFamily="18" charset="0"/>
+            </a:endParaRPr>
           </a:p>
         </p:txBody>
       </p:sp>
@@ -12359,7 +12586,9 @@
           <a:lstStyle/>
           <a:p>
             <a:pPr algn="ctr"/>
-            <a:endParaRPr lang="en-US" dirty="0"/>
+            <a:endParaRPr lang="en-US" dirty="0">
+              <a:latin typeface="Baskervald ADF Std" pitchFamily="18" charset="0"/>
+            </a:endParaRPr>
           </a:p>
         </p:txBody>
       </p:sp>
@@ -12399,7 +12628,9 @@
           <a:lstStyle/>
           <a:p>
             <a:pPr algn="ctr"/>
-            <a:endParaRPr lang="en-US" dirty="0"/>
+            <a:endParaRPr lang="en-US" dirty="0">
+              <a:latin typeface="Baskervald ADF Std" pitchFamily="18" charset="0"/>
+            </a:endParaRPr>
           </a:p>
         </p:txBody>
       </p:sp>
@@ -12439,7 +12670,9 @@
           <a:lstStyle/>
           <a:p>
             <a:pPr algn="ctr"/>
-            <a:endParaRPr lang="en-US" dirty="0"/>
+            <a:endParaRPr lang="en-US" dirty="0">
+              <a:latin typeface="Baskervald ADF Std" pitchFamily="18" charset="0"/>
+            </a:endParaRPr>
           </a:p>
         </p:txBody>
       </p:sp>
@@ -12479,7 +12712,9 @@
           <a:lstStyle/>
           <a:p>
             <a:pPr algn="ctr"/>
-            <a:endParaRPr lang="en-US" dirty="0"/>
+            <a:endParaRPr lang="en-US" dirty="0">
+              <a:latin typeface="Baskervald ADF Std" pitchFamily="18" charset="0"/>
+            </a:endParaRPr>
           </a:p>
         </p:txBody>
       </p:sp>
@@ -12519,7 +12754,9 @@
           <a:lstStyle/>
           <a:p>
             <a:pPr algn="ctr"/>
-            <a:endParaRPr lang="en-US" dirty="0"/>
+            <a:endParaRPr lang="en-US" dirty="0">
+              <a:latin typeface="Baskervald ADF Std" pitchFamily="18" charset="0"/>
+            </a:endParaRPr>
           </a:p>
         </p:txBody>
       </p:sp>
@@ -12559,7 +12796,9 @@
           <a:lstStyle/>
           <a:p>
             <a:pPr algn="ctr"/>
-            <a:endParaRPr lang="en-US" dirty="0"/>
+            <a:endParaRPr lang="en-US" dirty="0">
+              <a:latin typeface="Baskervald ADF Std" pitchFamily="18" charset="0"/>
+            </a:endParaRPr>
           </a:p>
         </p:txBody>
       </p:sp>
@@ -12599,7 +12838,9 @@
           <a:lstStyle/>
           <a:p>
             <a:pPr algn="ctr"/>
-            <a:endParaRPr lang="en-US" dirty="0"/>
+            <a:endParaRPr lang="en-US" dirty="0">
+              <a:latin typeface="Baskervald ADF Std" pitchFamily="18" charset="0"/>
+            </a:endParaRPr>
           </a:p>
         </p:txBody>
       </p:sp>
@@ -12639,7 +12880,9 @@
           <a:lstStyle/>
           <a:p>
             <a:pPr algn="ctr"/>
-            <a:endParaRPr lang="en-US" dirty="0"/>
+            <a:endParaRPr lang="en-US" dirty="0">
+              <a:latin typeface="Baskervald ADF Std" pitchFamily="18" charset="0"/>
+            </a:endParaRPr>
           </a:p>
         </p:txBody>
       </p:sp>
@@ -12679,7 +12922,9 @@
           <a:lstStyle/>
           <a:p>
             <a:pPr algn="ctr"/>
-            <a:endParaRPr lang="en-US" dirty="0"/>
+            <a:endParaRPr lang="en-US" dirty="0">
+              <a:latin typeface="Baskervald ADF Std" pitchFamily="18" charset="0"/>
+            </a:endParaRPr>
           </a:p>
         </p:txBody>
       </p:sp>
@@ -12719,7 +12964,9 @@
           <a:lstStyle/>
           <a:p>
             <a:pPr algn="ctr"/>
-            <a:endParaRPr lang="en-US" dirty="0"/>
+            <a:endParaRPr lang="en-US" dirty="0">
+              <a:latin typeface="Baskervald ADF Std" pitchFamily="18" charset="0"/>
+            </a:endParaRPr>
           </a:p>
         </p:txBody>
       </p:sp>
@@ -12759,7 +13006,9 @@
           <a:lstStyle/>
           <a:p>
             <a:pPr algn="ctr"/>
-            <a:endParaRPr lang="en-US" dirty="0"/>
+            <a:endParaRPr lang="en-US" dirty="0">
+              <a:latin typeface="Baskervald ADF Std" pitchFamily="18" charset="0"/>
+            </a:endParaRPr>
           </a:p>
         </p:txBody>
       </p:sp>
@@ -12799,7 +13048,9 @@
           <a:lstStyle/>
           <a:p>
             <a:pPr algn="ctr"/>
-            <a:endParaRPr lang="en-US" dirty="0"/>
+            <a:endParaRPr lang="en-US" dirty="0">
+              <a:latin typeface="Baskervald ADF Std" pitchFamily="18" charset="0"/>
+            </a:endParaRPr>
           </a:p>
         </p:txBody>
       </p:sp>
@@ -12839,7 +13090,9 @@
           <a:lstStyle/>
           <a:p>
             <a:pPr algn="ctr"/>
-            <a:endParaRPr lang="en-US" dirty="0"/>
+            <a:endParaRPr lang="en-US" dirty="0">
+              <a:latin typeface="Baskervald ADF Std" pitchFamily="18" charset="0"/>
+            </a:endParaRPr>
           </a:p>
         </p:txBody>
       </p:sp>
@@ -12879,7 +13132,9 @@
           <a:lstStyle/>
           <a:p>
             <a:pPr algn="ctr"/>
-            <a:endParaRPr lang="en-US" dirty="0"/>
+            <a:endParaRPr lang="en-US" dirty="0">
+              <a:latin typeface="Baskervald ADF Std" pitchFamily="18" charset="0"/>
+            </a:endParaRPr>
           </a:p>
         </p:txBody>
       </p:sp>
@@ -12919,7 +13174,9 @@
           <a:lstStyle/>
           <a:p>
             <a:pPr algn="ctr"/>
-            <a:endParaRPr lang="en-US" dirty="0"/>
+            <a:endParaRPr lang="en-US" dirty="0">
+              <a:latin typeface="Baskervald ADF Std" pitchFamily="18" charset="0"/>
+            </a:endParaRPr>
           </a:p>
         </p:txBody>
       </p:sp>
@@ -12959,7 +13216,9 @@
           <a:lstStyle/>
           <a:p>
             <a:pPr algn="ctr"/>
-            <a:endParaRPr lang="en-US" dirty="0"/>
+            <a:endParaRPr lang="en-US" dirty="0">
+              <a:latin typeface="Baskervald ADF Std" pitchFamily="18" charset="0"/>
+            </a:endParaRPr>
           </a:p>
         </p:txBody>
       </p:sp>
@@ -12999,7 +13258,9 @@
           <a:lstStyle/>
           <a:p>
             <a:pPr algn="ctr"/>
-            <a:endParaRPr lang="en-US" dirty="0"/>
+            <a:endParaRPr lang="en-US" dirty="0">
+              <a:latin typeface="Baskervald ADF Std" pitchFamily="18" charset="0"/>
+            </a:endParaRPr>
           </a:p>
         </p:txBody>
       </p:sp>
@@ -13170,6 +13431,7 @@
                 <a:solidFill>
                   <a:srgbClr val="FF0000"/>
                 </a:solidFill>
+                <a:latin typeface="Baskervald ADF Std" pitchFamily="18" charset="0"/>
               </a:rPr>
               <a:t>2 stage Neural Network</a:t>
             </a:r>
@@ -13177,6 +13439,7 @@
               <a:solidFill>
                 <a:schemeClr val="tx1"/>
               </a:solidFill>
+              <a:latin typeface="Baskervald ADF Std" pitchFamily="18" charset="0"/>
             </a:endParaRPr>
           </a:p>
         </p:txBody>
@@ -13270,6 +13533,7 @@
               <a:solidFill>
                 <a:schemeClr val="tx1"/>
               </a:solidFill>
+              <a:latin typeface="Baskervald ADF Std" pitchFamily="18" charset="0"/>
             </a:endParaRPr>
           </a:p>
         </p:txBody>
@@ -13343,6 +13607,7 @@
                 <a:solidFill>
                   <a:srgbClr val="FF0000"/>
                 </a:solidFill>
+                <a:latin typeface="Baskervald ADF Std" pitchFamily="18" charset="0"/>
               </a:rPr>
               <a:t>c</a:t>
             </a:r>
@@ -13351,6 +13616,7 @@
                 <a:solidFill>
                   <a:srgbClr val="FF0000"/>
                 </a:solidFill>
+                <a:latin typeface="Baskervald ADF Std" pitchFamily="18" charset="0"/>
               </a:rPr>
               <a:t>oncatenate</a:t>
             </a:r>
@@ -13364,6 +13630,7 @@
                 <a:solidFill>
                   <a:srgbClr val="FF0000"/>
                 </a:solidFill>
+                <a:latin typeface="Baskervald ADF Std" pitchFamily="18" charset="0"/>
               </a:rPr>
               <a:t>(1D vector)</a:t>
             </a:r>
@@ -13371,6 +13638,7 @@
               <a:solidFill>
                 <a:srgbClr val="FF0000"/>
               </a:solidFill>
+              <a:latin typeface="Baskervald ADF Std" pitchFamily="18" charset="0"/>
             </a:endParaRPr>
           </a:p>
         </p:txBody>
@@ -13404,6 +13672,7 @@
                 <a:solidFill>
                   <a:srgbClr val="FF0000"/>
                 </a:solidFill>
+                <a:latin typeface="Baskervald ADF Std" pitchFamily="18" charset="0"/>
               </a:rPr>
               <a:t>h</a:t>
             </a:r>
@@ -13412,10 +13681,13 @@
                 <a:solidFill>
                   <a:srgbClr val="FF0000"/>
                 </a:solidFill>
+                <a:latin typeface="Baskervald ADF Std" pitchFamily="18" charset="0"/>
               </a:rPr>
               <a:t>eat-maps</a:t>
             </a:r>
-            <a:endParaRPr lang="en-US" sz="1400" dirty="0"/>
+            <a:endParaRPr lang="en-US" sz="1400" dirty="0">
+              <a:latin typeface="Baskervald ADF Std" pitchFamily="18" charset="0"/>
+            </a:endParaRPr>
           </a:p>
         </p:txBody>
       </p:sp>
@@ -13427,8 +13699,8 @@
         </p:nvSpPr>
         <p:spPr>
           <a:xfrm>
-            <a:off x="2483711" y="1320974"/>
-            <a:ext cx="628697" cy="307777"/>
+            <a:off x="2469284" y="1320974"/>
+            <a:ext cx="657552" cy="307777"/>
           </a:xfrm>
           <a:prstGeom prst="rect">
             <a:avLst/>
@@ -13448,6 +13720,7 @@
                 <a:solidFill>
                   <a:schemeClr val="tx2"/>
                 </a:solidFill>
+                <a:latin typeface="Baskervald ADF Std" pitchFamily="18" charset="0"/>
               </a:rPr>
               <a:t>96x96</a:t>
             </a:r>
@@ -13455,6 +13728,7 @@
               <a:solidFill>
                 <a:schemeClr val="tx2"/>
               </a:solidFill>
+              <a:latin typeface="Baskervald ADF Std" pitchFamily="18" charset="0"/>
             </a:endParaRPr>
           </a:p>
         </p:txBody>
@@ -13467,8 +13741,8 @@
         </p:nvSpPr>
         <p:spPr>
           <a:xfrm>
-            <a:off x="2483711" y="1969065"/>
-            <a:ext cx="628697" cy="307777"/>
+            <a:off x="2475696" y="1969065"/>
+            <a:ext cx="644728" cy="307777"/>
           </a:xfrm>
           <a:prstGeom prst="rect">
             <a:avLst/>
@@ -13488,6 +13762,7 @@
                 <a:solidFill>
                   <a:schemeClr val="tx2"/>
                 </a:solidFill>
+                <a:latin typeface="Baskervald ADF Std" pitchFamily="18" charset="0"/>
               </a:rPr>
               <a:t>48x48</a:t>
             </a:r>
@@ -13495,6 +13770,7 @@
               <a:solidFill>
                 <a:schemeClr val="tx2"/>
               </a:solidFill>
+              <a:latin typeface="Baskervald ADF Std" pitchFamily="18" charset="0"/>
             </a:endParaRPr>
           </a:p>
         </p:txBody>
@@ -13528,6 +13804,7 @@
                 <a:solidFill>
                   <a:schemeClr val="tx2"/>
                 </a:solidFill>
+                <a:latin typeface="Baskervald ADF Std" pitchFamily="18" charset="0"/>
               </a:rPr>
               <a:t>24x24</a:t>
             </a:r>
@@ -13535,6 +13812,7 @@
               <a:solidFill>
                 <a:schemeClr val="tx2"/>
               </a:solidFill>
+              <a:latin typeface="Baskervald ADF Std" pitchFamily="18" charset="0"/>
             </a:endParaRPr>
           </a:p>
         </p:txBody>
@@ -13641,7 +13919,9 @@
           <a:lstStyle/>
           <a:p>
             <a:pPr algn="ctr"/>
-            <a:endParaRPr lang="en-US" dirty="0"/>
+            <a:endParaRPr lang="en-US" dirty="0">
+              <a:latin typeface="Baskervald ADF Std" pitchFamily="18" charset="0"/>
+            </a:endParaRPr>
           </a:p>
         </p:txBody>
       </p:sp>
@@ -13681,7 +13961,9 @@
           <a:lstStyle/>
           <a:p>
             <a:pPr algn="ctr"/>
-            <a:endParaRPr lang="en-US" dirty="0"/>
+            <a:endParaRPr lang="en-US" dirty="0">
+              <a:latin typeface="Baskervald ADF Std" pitchFamily="18" charset="0"/>
+            </a:endParaRPr>
           </a:p>
         </p:txBody>
       </p:sp>
@@ -13721,7 +14003,9 @@
           <a:lstStyle/>
           <a:p>
             <a:pPr algn="ctr"/>
-            <a:endParaRPr lang="en-US" dirty="0"/>
+            <a:endParaRPr lang="en-US" dirty="0">
+              <a:latin typeface="Baskervald ADF Std" pitchFamily="18" charset="0"/>
+            </a:endParaRPr>
           </a:p>
         </p:txBody>
       </p:sp>
@@ -13761,7 +14045,9 @@
           <a:lstStyle/>
           <a:p>
             <a:pPr algn="ctr"/>
-            <a:endParaRPr lang="en-US" dirty="0"/>
+            <a:endParaRPr lang="en-US" dirty="0">
+              <a:latin typeface="Baskervald ADF Std" pitchFamily="18" charset="0"/>
+            </a:endParaRPr>
           </a:p>
         </p:txBody>
       </p:sp>
@@ -13801,7 +14087,9 @@
           <a:lstStyle/>
           <a:p>
             <a:pPr algn="ctr"/>
-            <a:endParaRPr lang="en-US" dirty="0"/>
+            <a:endParaRPr lang="en-US" dirty="0">
+              <a:latin typeface="Baskervald ADF Std" pitchFamily="18" charset="0"/>
+            </a:endParaRPr>
           </a:p>
         </p:txBody>
       </p:sp>
@@ -13841,7 +14129,9 @@
           <a:lstStyle/>
           <a:p>
             <a:pPr algn="ctr"/>
-            <a:endParaRPr lang="en-US" dirty="0"/>
+            <a:endParaRPr lang="en-US" dirty="0">
+              <a:latin typeface="Baskervald ADF Std" pitchFamily="18" charset="0"/>
+            </a:endParaRPr>
           </a:p>
         </p:txBody>
       </p:sp>
@@ -14369,10 +14659,14 @@
           <a:p>
             <a:pPr algn="ctr"/>
             <a:r>
-              <a:rPr lang="en-US" dirty="0" smtClean="0"/>
+              <a:rPr lang="en-US" dirty="0" smtClean="0">
+                <a:latin typeface="Baskervald ADF Std" pitchFamily="18" charset="0"/>
+              </a:rPr>
               <a:t>5x5 convolution</a:t>
             </a:r>
-            <a:endParaRPr lang="en-US" dirty="0"/>
+            <a:endParaRPr lang="en-US" dirty="0">
+              <a:latin typeface="Baskervald ADF Std" pitchFamily="18" charset="0"/>
+            </a:endParaRPr>
           </a:p>
         </p:txBody>
       </p:sp>
@@ -14400,13 +14694,17 @@
           <a:p>
             <a:pPr algn="ctr"/>
             <a:r>
-              <a:rPr lang="en-US" dirty="0" smtClean="0"/>
+              <a:rPr lang="en-US" dirty="0" smtClean="0">
+                <a:latin typeface="Baskervald ADF Std" pitchFamily="18" charset="0"/>
+              </a:rPr>
               <a:t>16x92x92</a:t>
             </a:r>
           </a:p>
           <a:p>
             <a:pPr algn="ctr"/>
-            <a:endParaRPr lang="en-US" dirty="0"/>
+            <a:endParaRPr lang="en-US" dirty="0">
+              <a:latin typeface="Baskervald ADF Std" pitchFamily="18" charset="0"/>
+            </a:endParaRPr>
           </a:p>
         </p:txBody>
       </p:sp>
@@ -14707,10 +15005,14 @@
           <a:p>
             <a:pPr algn="ctr"/>
             <a:r>
-              <a:rPr lang="en-US" dirty="0" smtClean="0"/>
+              <a:rPr lang="en-US" dirty="0" smtClean="0">
+                <a:latin typeface="Baskervald ADF Std" pitchFamily="18" charset="0"/>
+              </a:rPr>
               <a:t>4x4 maxpool + ReLU</a:t>
             </a:r>
-            <a:endParaRPr lang="en-US" dirty="0"/>
+            <a:endParaRPr lang="en-US" dirty="0">
+              <a:latin typeface="Baskervald ADF Std" pitchFamily="18" charset="0"/>
+            </a:endParaRPr>
           </a:p>
         </p:txBody>
       </p:sp>
@@ -14738,10 +15040,14 @@
           <a:p>
             <a:pPr algn="ctr"/>
             <a:r>
-              <a:rPr lang="en-US" dirty="0" smtClean="0"/>
+              <a:rPr lang="en-US" dirty="0" smtClean="0">
+                <a:latin typeface="Baskervald ADF Std" pitchFamily="18" charset="0"/>
+              </a:rPr>
               <a:t>1x96x96</a:t>
             </a:r>
-            <a:endParaRPr lang="en-US" dirty="0"/>
+            <a:endParaRPr lang="en-US" dirty="0">
+              <a:latin typeface="Baskervald ADF Std" pitchFamily="18" charset="0"/>
+            </a:endParaRPr>
           </a:p>
         </p:txBody>
       </p:sp>
@@ -14769,13 +15075,17 @@
           <a:p>
             <a:pPr algn="ctr"/>
             <a:r>
-              <a:rPr lang="en-US" dirty="0" smtClean="0"/>
+              <a:rPr lang="en-US" dirty="0" smtClean="0">
+                <a:latin typeface="Baskervald ADF Std" pitchFamily="18" charset="0"/>
+              </a:rPr>
               <a:t>16x23x23</a:t>
             </a:r>
           </a:p>
           <a:p>
             <a:pPr algn="ctr"/>
-            <a:endParaRPr lang="en-US" dirty="0"/>
+            <a:endParaRPr lang="en-US" dirty="0">
+              <a:latin typeface="Baskervald ADF Std" pitchFamily="18" charset="0"/>
+            </a:endParaRPr>
           </a:p>
         </p:txBody>
       </p:sp>
@@ -15229,13 +15539,17 @@
           <a:p>
             <a:pPr algn="ctr"/>
             <a:r>
-              <a:rPr lang="en-US" dirty="0" smtClean="0"/>
+              <a:rPr lang="en-US" dirty="0" smtClean="0">
+                <a:latin typeface="Baskervald ADF Std" pitchFamily="18" charset="0"/>
+              </a:rPr>
               <a:t>32x22x22</a:t>
             </a:r>
           </a:p>
           <a:p>
             <a:pPr algn="ctr"/>
-            <a:endParaRPr lang="en-US" dirty="0"/>
+            <a:endParaRPr lang="en-US" dirty="0">
+              <a:latin typeface="Baskervald ADF Std" pitchFamily="18" charset="0"/>
+            </a:endParaRPr>
           </a:p>
         </p:txBody>
       </p:sp>
@@ -15300,10 +15614,14 @@
           <a:p>
             <a:pPr algn="ctr"/>
             <a:r>
-              <a:rPr lang="en-US" dirty="0" smtClean="0"/>
+              <a:rPr lang="en-US" dirty="0" smtClean="0">
+                <a:latin typeface="Baskervald ADF Std" pitchFamily="18" charset="0"/>
+              </a:rPr>
               <a:t>6x6 convolution</a:t>
             </a:r>
-            <a:endParaRPr lang="en-US" dirty="0"/>
+            <a:endParaRPr lang="en-US" dirty="0">
+              <a:latin typeface="Baskervald ADF Std" pitchFamily="18" charset="0"/>
+            </a:endParaRPr>
           </a:p>
         </p:txBody>
       </p:sp>
@@ -15508,13 +15826,17 @@
           <a:p>
             <a:pPr algn="ctr"/>
             <a:r>
-              <a:rPr lang="en-US" dirty="0" smtClean="0"/>
+              <a:rPr lang="en-US" dirty="0" smtClean="0">
+                <a:latin typeface="Baskervald ADF Std" pitchFamily="18" charset="0"/>
+              </a:rPr>
               <a:t>32x9x9</a:t>
             </a:r>
           </a:p>
           <a:p>
             <a:pPr algn="ctr"/>
-            <a:endParaRPr lang="en-US" dirty="0"/>
+            <a:endParaRPr lang="en-US" dirty="0">
+              <a:latin typeface="Baskervald ADF Std" pitchFamily="18" charset="0"/>
+            </a:endParaRPr>
           </a:p>
         </p:txBody>
       </p:sp>
@@ -15579,15 +15901,21 @@
           <a:p>
             <a:pPr algn="ctr"/>
             <a:r>
-              <a:rPr lang="en-US" dirty="0"/>
+              <a:rPr lang="en-US" dirty="0">
+                <a:latin typeface="Baskervald ADF Std" pitchFamily="18" charset="0"/>
+              </a:rPr>
               <a:t>2</a:t>
             </a:r>
             <a:r>
-              <a:rPr lang="en-US" dirty="0" smtClean="0"/>
+              <a:rPr lang="en-US" dirty="0" smtClean="0">
+                <a:latin typeface="Baskervald ADF Std" pitchFamily="18" charset="0"/>
+              </a:rPr>
               <a:t>x2 </a:t>
             </a:r>
             <a:r>
-              <a:rPr lang="en-US" dirty="0"/>
+              <a:rPr lang="en-US" dirty="0">
+                <a:latin typeface="Baskervald ADF Std" pitchFamily="18" charset="0"/>
+              </a:rPr>
               <a:t>maxpool + ReLU</a:t>
             </a:r>
           </a:p>
@@ -16080,7 +16408,9 @@
           <a:lstStyle/>
           <a:p>
             <a:pPr algn="ctr"/>
-            <a:endParaRPr lang="en-US" dirty="0"/>
+            <a:endParaRPr lang="en-US" dirty="0">
+              <a:latin typeface="Baskervald ADF Std" pitchFamily="18" charset="0"/>
+            </a:endParaRPr>
           </a:p>
         </p:txBody>
       </p:sp>
@@ -16128,7 +16458,9 @@
           <a:lstStyle/>
           <a:p>
             <a:pPr algn="ctr"/>
-            <a:endParaRPr lang="en-US" dirty="0"/>
+            <a:endParaRPr lang="en-US" dirty="0">
+              <a:latin typeface="Baskervald ADF Std" pitchFamily="18" charset="0"/>
+            </a:endParaRPr>
           </a:p>
         </p:txBody>
       </p:sp>
@@ -16176,7 +16508,9 @@
           <a:lstStyle/>
           <a:p>
             <a:pPr algn="ctr"/>
-            <a:endParaRPr lang="en-US" dirty="0"/>
+            <a:endParaRPr lang="en-US" dirty="0">
+              <a:latin typeface="Baskervald ADF Std" pitchFamily="18" charset="0"/>
+            </a:endParaRPr>
           </a:p>
         </p:txBody>
       </p:sp>
@@ -16224,7 +16558,9 @@
           <a:lstStyle/>
           <a:p>
             <a:pPr algn="ctr"/>
-            <a:endParaRPr lang="en-US" dirty="0"/>
+            <a:endParaRPr lang="en-US" dirty="0">
+              <a:latin typeface="Baskervald ADF Std" pitchFamily="18" charset="0"/>
+            </a:endParaRPr>
           </a:p>
         </p:txBody>
       </p:sp>
@@ -16272,7 +16608,9 @@
           <a:lstStyle/>
           <a:p>
             <a:pPr algn="ctr"/>
-            <a:endParaRPr lang="en-US" dirty="0"/>
+            <a:endParaRPr lang="en-US" dirty="0">
+              <a:latin typeface="Baskervald ADF Std" pitchFamily="18" charset="0"/>
+            </a:endParaRPr>
           </a:p>
         </p:txBody>
       </p:sp>
@@ -16428,7 +16766,9 @@
           <a:lstStyle/>
           <a:p>
             <a:pPr algn="ctr"/>
-            <a:endParaRPr lang="en-US" dirty="0"/>
+            <a:endParaRPr lang="en-US" dirty="0">
+              <a:latin typeface="Baskervald ADF Std" pitchFamily="18" charset="0"/>
+            </a:endParaRPr>
           </a:p>
         </p:txBody>
       </p:sp>
@@ -16476,7 +16816,9 @@
           <a:lstStyle/>
           <a:p>
             <a:pPr algn="ctr"/>
-            <a:endParaRPr lang="en-US" dirty="0"/>
+            <a:endParaRPr lang="en-US" dirty="0">
+              <a:latin typeface="Baskervald ADF Std" pitchFamily="18" charset="0"/>
+            </a:endParaRPr>
           </a:p>
         </p:txBody>
       </p:sp>
@@ -16524,7 +16866,9 @@
           <a:lstStyle/>
           <a:p>
             <a:pPr algn="ctr"/>
-            <a:endParaRPr lang="en-US" dirty="0"/>
+            <a:endParaRPr lang="en-US" dirty="0">
+              <a:latin typeface="Baskervald ADF Std" pitchFamily="18" charset="0"/>
+            </a:endParaRPr>
           </a:p>
         </p:txBody>
       </p:sp>
@@ -16572,7 +16916,9 @@
           <a:lstStyle/>
           <a:p>
             <a:pPr algn="ctr"/>
-            <a:endParaRPr lang="en-US" dirty="0"/>
+            <a:endParaRPr lang="en-US" dirty="0">
+              <a:latin typeface="Baskervald ADF Std" pitchFamily="18" charset="0"/>
+            </a:endParaRPr>
           </a:p>
         </p:txBody>
       </p:sp>
@@ -16728,7 +17074,9 @@
           <a:lstStyle/>
           <a:p>
             <a:pPr algn="ctr"/>
-            <a:endParaRPr lang="en-US" dirty="0"/>
+            <a:endParaRPr lang="en-US" dirty="0">
+              <a:latin typeface="Baskervald ADF Std" pitchFamily="18" charset="0"/>
+            </a:endParaRPr>
           </a:p>
         </p:txBody>
       </p:sp>
@@ -16776,7 +17124,9 @@
           <a:lstStyle/>
           <a:p>
             <a:pPr algn="ctr"/>
-            <a:endParaRPr lang="en-US" dirty="0"/>
+            <a:endParaRPr lang="en-US" dirty="0">
+              <a:latin typeface="Baskervald ADF Std" pitchFamily="18" charset="0"/>
+            </a:endParaRPr>
           </a:p>
         </p:txBody>
       </p:sp>
@@ -16824,7 +17174,9 @@
           <a:lstStyle/>
           <a:p>
             <a:pPr algn="ctr"/>
-            <a:endParaRPr lang="en-US" dirty="0"/>
+            <a:endParaRPr lang="en-US" dirty="0">
+              <a:latin typeface="Baskervald ADF Std" pitchFamily="18" charset="0"/>
+            </a:endParaRPr>
           </a:p>
         </p:txBody>
       </p:sp>
@@ -16872,7 +17224,9 @@
           <a:lstStyle/>
           <a:p>
             <a:pPr algn="ctr"/>
-            <a:endParaRPr lang="en-US" dirty="0"/>
+            <a:endParaRPr lang="en-US" dirty="0">
+              <a:latin typeface="Baskervald ADF Std" pitchFamily="18" charset="0"/>
+            </a:endParaRPr>
           </a:p>
         </p:txBody>
       </p:sp>
@@ -17799,8 +18153,8 @@
         </p:nvSpPr>
         <p:spPr>
           <a:xfrm>
-            <a:off x="1547582" y="960925"/>
-            <a:ext cx="877163" cy="307777"/>
+            <a:off x="1525140" y="960925"/>
+            <a:ext cx="922048" cy="307777"/>
           </a:xfrm>
           <a:prstGeom prst="rect">
             <a:avLst/>
@@ -17815,10 +18169,14 @@
           <a:p>
             <a:pPr algn="ctr"/>
             <a:r>
-              <a:rPr lang="en-US" sz="1400" dirty="0" smtClean="0"/>
+              <a:rPr lang="en-US" sz="1400" dirty="0" smtClean="0">
+                <a:latin typeface="Baskervald ADF Std" pitchFamily="18" charset="0"/>
+              </a:rPr>
               <a:t>3x32x9x9</a:t>
             </a:r>
-            <a:endParaRPr lang="en-US" sz="1400" dirty="0"/>
+            <a:endParaRPr lang="en-US" sz="1400" dirty="0">
+              <a:latin typeface="Baskervald ADF Std" pitchFamily="18" charset="0"/>
+            </a:endParaRPr>
           </a:p>
         </p:txBody>
       </p:sp>
@@ -17830,8 +18188,8 @@
         </p:nvSpPr>
         <p:spPr>
           <a:xfrm>
-            <a:off x="2637414" y="1104945"/>
-            <a:ext cx="550151" cy="307777"/>
+            <a:off x="2652643" y="1104945"/>
+            <a:ext cx="519693" cy="307777"/>
           </a:xfrm>
           <a:prstGeom prst="rect">
             <a:avLst/>
@@ -17846,10 +18204,14 @@
           <a:p>
             <a:pPr algn="ctr"/>
             <a:r>
-              <a:rPr lang="en-US" sz="1400" dirty="0" smtClean="0"/>
+              <a:rPr lang="en-US" sz="1400" dirty="0" smtClean="0">
+                <a:latin typeface="Baskervald ADF Std" pitchFamily="18" charset="0"/>
+              </a:rPr>
               <a:t>7776</a:t>
             </a:r>
-            <a:endParaRPr lang="en-US" sz="1400" dirty="0"/>
+            <a:endParaRPr lang="en-US" sz="1400" dirty="0">
+              <a:latin typeface="Baskervald ADF Std" pitchFamily="18" charset="0"/>
+            </a:endParaRPr>
           </a:p>
         </p:txBody>
       </p:sp>
@@ -17897,7 +18259,9 @@
           <a:lstStyle/>
           <a:p>
             <a:pPr algn="ctr"/>
-            <a:endParaRPr lang="en-US" dirty="0"/>
+            <a:endParaRPr lang="en-US" dirty="0">
+              <a:latin typeface="Baskervald ADF Std" pitchFamily="18" charset="0"/>
+            </a:endParaRPr>
           </a:p>
         </p:txBody>
       </p:sp>
@@ -18416,10 +18780,14 @@
           <a:p>
             <a:pPr algn="ctr"/>
             <a:r>
-              <a:rPr lang="en-US" sz="1400" dirty="0" smtClean="0"/>
+              <a:rPr lang="en-US" sz="1400" dirty="0" smtClean="0">
+                <a:latin typeface="Baskervald ADF Std" pitchFamily="18" charset="0"/>
+              </a:rPr>
               <a:t>4536</a:t>
             </a:r>
-            <a:endParaRPr lang="en-US" sz="1400" dirty="0"/>
+            <a:endParaRPr lang="en-US" sz="1400" dirty="0">
+              <a:latin typeface="Baskervald ADF Std" pitchFamily="18" charset="0"/>
+            </a:endParaRPr>
           </a:p>
         </p:txBody>
       </p:sp>
@@ -18518,10 +18886,14 @@
           <a:p>
             <a:pPr algn="ctr"/>
             <a:r>
-              <a:rPr lang="en-US" sz="1400" dirty="0" smtClean="0"/>
+              <a:rPr lang="en-US" sz="1400" dirty="0" smtClean="0">
+                <a:latin typeface="Baskervald ADF Std" pitchFamily="18" charset="0"/>
+              </a:rPr>
               <a:t>Neural Net</a:t>
             </a:r>
-            <a:endParaRPr lang="en-US" sz="1400" dirty="0"/>
+            <a:endParaRPr lang="en-US" sz="1400" dirty="0">
+              <a:latin typeface="Baskervald ADF Std" pitchFamily="18" charset="0"/>
+            </a:endParaRPr>
           </a:p>
         </p:txBody>
       </p:sp>
@@ -18548,10 +18920,14 @@
           <a:lstStyle/>
           <a:p>
             <a:r>
-              <a:rPr lang="en-US" sz="1400" dirty="0" smtClean="0"/>
+              <a:rPr lang="en-US" sz="1400" dirty="0" smtClean="0">
+                <a:latin typeface="Baskervald ADF Std" pitchFamily="18" charset="0"/>
+              </a:rPr>
               <a:t>resize</a:t>
             </a:r>
-            <a:endParaRPr lang="en-US" sz="1400" dirty="0"/>
+            <a:endParaRPr lang="en-US" sz="1400" dirty="0">
+              <a:latin typeface="Baskervald ADF Std" pitchFamily="18" charset="0"/>
+            </a:endParaRPr>
           </a:p>
         </p:txBody>
       </p:sp>
@@ -18599,7 +18975,9 @@
           <a:lstStyle/>
           <a:p>
             <a:pPr algn="ctr"/>
-            <a:endParaRPr lang="en-US" dirty="0"/>
+            <a:endParaRPr lang="en-US" dirty="0">
+              <a:latin typeface="Baskervald ADF Std" pitchFamily="18" charset="0"/>
+            </a:endParaRPr>
           </a:p>
         </p:txBody>
       </p:sp>
@@ -19082,10 +19460,14 @@
           <a:p>
             <a:pPr algn="ctr"/>
             <a:r>
-              <a:rPr lang="en-US" sz="1400" dirty="0" smtClean="0"/>
+              <a:rPr lang="en-US" sz="1400" dirty="0" smtClean="0">
+                <a:latin typeface="Baskervald ADF Std" pitchFamily="18" charset="0"/>
+              </a:rPr>
               <a:t>4536</a:t>
             </a:r>
-            <a:endParaRPr lang="en-US" sz="1400" dirty="0"/>
+            <a:endParaRPr lang="en-US" sz="1400" dirty="0">
+              <a:latin typeface="Baskervald ADF Std" pitchFamily="18" charset="0"/>
+            </a:endParaRPr>
           </a:p>
         </p:txBody>
       </p:sp>
@@ -19205,7 +19587,9 @@
           <a:lstStyle/>
           <a:p>
             <a:pPr algn="ctr"/>
-            <a:endParaRPr lang="en-US" dirty="0"/>
+            <a:endParaRPr lang="en-US" dirty="0">
+              <a:latin typeface="Baskervald ADF Std" pitchFamily="18" charset="0"/>
+            </a:endParaRPr>
           </a:p>
         </p:txBody>
       </p:sp>
@@ -19688,10 +20072,14 @@
           <a:p>
             <a:pPr algn="ctr"/>
             <a:r>
-              <a:rPr lang="en-US" sz="1400" dirty="0" smtClean="0"/>
+              <a:rPr lang="en-US" sz="1400" dirty="0" smtClean="0">
+                <a:latin typeface="Baskervald ADF Std" pitchFamily="18" charset="0"/>
+              </a:rPr>
               <a:t>4536</a:t>
             </a:r>
-            <a:endParaRPr lang="en-US" sz="1400" dirty="0"/>
+            <a:endParaRPr lang="en-US" sz="1400" dirty="0">
+              <a:latin typeface="Baskervald ADF Std" pitchFamily="18" charset="0"/>
+            </a:endParaRPr>
           </a:p>
         </p:txBody>
       </p:sp>
@@ -19738,8 +20126,8 @@
         </p:nvSpPr>
         <p:spPr>
           <a:xfrm>
-            <a:off x="3419840" y="1969065"/>
-            <a:ext cx="555986" cy="307777"/>
+            <a:off x="3398745" y="1969065"/>
+            <a:ext cx="598177" cy="307777"/>
           </a:xfrm>
           <a:prstGeom prst="rect">
             <a:avLst/>
@@ -19754,10 +20142,14 @@
           <a:p>
             <a:pPr algn="ctr"/>
             <a:r>
-              <a:rPr lang="en-US" sz="1400" dirty="0" smtClean="0"/>
+              <a:rPr lang="en-US" sz="1400" dirty="0" smtClean="0">
+                <a:latin typeface="Baskervald ADF Std" pitchFamily="18" charset="0"/>
+              </a:rPr>
               <a:t>ReLU</a:t>
             </a:r>
-            <a:endParaRPr lang="en-US" sz="1400" dirty="0"/>
+            <a:endParaRPr lang="en-US" sz="1400" dirty="0">
+              <a:latin typeface="Baskervald ADF Std" pitchFamily="18" charset="0"/>
+            </a:endParaRPr>
           </a:p>
         </p:txBody>
       </p:sp>
@@ -20261,17 +20653,23 @@
           <a:p>
             <a:pPr algn="ctr"/>
             <a:r>
-              <a:rPr lang="en-US" sz="1400" dirty="0" smtClean="0"/>
+              <a:rPr lang="en-US" sz="1400" dirty="0" smtClean="0">
+                <a:latin typeface="Baskervald ADF Std" pitchFamily="18" charset="0"/>
+              </a:rPr>
               <a:t>14x18x18</a:t>
             </a:r>
           </a:p>
           <a:p>
             <a:pPr algn="ctr"/>
             <a:r>
-              <a:rPr lang="en-US" sz="1400" dirty="0" smtClean="0"/>
+              <a:rPr lang="en-US" sz="1400" dirty="0" smtClean="0">
+                <a:latin typeface="Baskervald ADF Std" pitchFamily="18" charset="0"/>
+              </a:rPr>
               <a:t>Heat-maps</a:t>
             </a:r>
-            <a:endParaRPr lang="en-US" sz="1400" dirty="0"/>
+            <a:endParaRPr lang="en-US" sz="1400" dirty="0">
+              <a:latin typeface="Baskervald ADF Std" pitchFamily="18" charset="0"/>
+            </a:endParaRPr>
           </a:p>
         </p:txBody>
       </p:sp>
@@ -20299,10 +20697,14 @@
           <a:p>
             <a:pPr algn="ctr"/>
             <a:r>
-              <a:rPr lang="en-US" sz="1400" dirty="0" smtClean="0"/>
+              <a:rPr lang="en-US" sz="1400" dirty="0" smtClean="0">
+                <a:latin typeface="Baskervald ADF Std" pitchFamily="18" charset="0"/>
+              </a:rPr>
               <a:t>resize</a:t>
             </a:r>
-            <a:endParaRPr lang="en-US" sz="1400" dirty="0"/>
+            <a:endParaRPr lang="en-US" sz="1400" dirty="0">
+              <a:latin typeface="Baskervald ADF Std" pitchFamily="18" charset="0"/>
+            </a:endParaRPr>
           </a:p>
         </p:txBody>
       </p:sp>
@@ -20330,10 +20732,14 @@
           <a:p>
             <a:pPr algn="ctr"/>
             <a:r>
-              <a:rPr lang="en-US" sz="1400" dirty="0" smtClean="0"/>
+              <a:rPr lang="en-US" sz="1400" dirty="0" smtClean="0">
+                <a:latin typeface="Baskervald ADF Std" pitchFamily="18" charset="0"/>
+              </a:rPr>
               <a:t>Neural Net</a:t>
             </a:r>
-            <a:endParaRPr lang="en-US" sz="1400" dirty="0"/>
+            <a:endParaRPr lang="en-US" sz="1400" dirty="0">
+              <a:latin typeface="Baskervald ADF Std" pitchFamily="18" charset="0"/>
+            </a:endParaRPr>
           </a:p>
         </p:txBody>
       </p:sp>

</xml_diff>

<commit_message>
more updates for the paper.
</commit_message>
<xml_diff>
--- a/TOG_Paper/figures.pptx
+++ b/TOG_Paper/figures.pptx
@@ -5,7 +5,7 @@
     <p:sldMasterId id="2147483648" r:id="rId1"/>
   </p:sldMasterIdLst>
   <p:notesMasterIdLst>
-    <p:notesMasterId r:id="rId13"/>
+    <p:notesMasterId r:id="rId14"/>
   </p:notesMasterIdLst>
   <p:sldIdLst>
     <p:sldId id="256" r:id="rId2"/>
@@ -19,6 +19,7 @@
     <p:sldId id="264" r:id="rId10"/>
     <p:sldId id="262" r:id="rId11"/>
     <p:sldId id="265" r:id="rId12"/>
+    <p:sldId id="267" r:id="rId13"/>
   </p:sldIdLst>
   <p:sldSz cx="9144000" cy="6858000" type="screen4x3"/>
   <p:notesSz cx="6858000" cy="9144000"/>
@@ -202,7 +203,7 @@
           <a:p>
             <a:fld id="{4124E618-6992-4B85-958A-B5B4B6B9F3C2}" type="datetimeFigureOut">
               <a:rPr lang="en-US" smtClean="0"/>
-              <a:t>7/14/2013</a:t>
+              <a:t>7/20/2013</a:t>
             </a:fld>
             <a:endParaRPr lang="en-US" dirty="0"/>
           </a:p>
@@ -1097,7 +1098,7 @@
             <a:fld id="{1D8BD707-D9CF-40AE-B4C6-C98DA3205C09}" type="datetimeFigureOut">
               <a:rPr lang="en-US" smtClean="0"/>
               <a:pPr/>
-              <a:t>7/14/2013</a:t>
+              <a:t>7/20/2013</a:t>
             </a:fld>
             <a:endParaRPr lang="en-US" dirty="0"/>
           </a:p>
@@ -1264,7 +1265,7 @@
             <a:fld id="{1D8BD707-D9CF-40AE-B4C6-C98DA3205C09}" type="datetimeFigureOut">
               <a:rPr lang="en-US" smtClean="0"/>
               <a:pPr/>
-              <a:t>7/14/2013</a:t>
+              <a:t>7/20/2013</a:t>
             </a:fld>
             <a:endParaRPr lang="en-US" dirty="0"/>
           </a:p>
@@ -1441,7 +1442,7 @@
             <a:fld id="{1D8BD707-D9CF-40AE-B4C6-C98DA3205C09}" type="datetimeFigureOut">
               <a:rPr lang="en-US" smtClean="0"/>
               <a:pPr/>
-              <a:t>7/14/2013</a:t>
+              <a:t>7/20/2013</a:t>
             </a:fld>
             <a:endParaRPr lang="en-US" dirty="0"/>
           </a:p>
@@ -1608,7 +1609,7 @@
             <a:fld id="{1D8BD707-D9CF-40AE-B4C6-C98DA3205C09}" type="datetimeFigureOut">
               <a:rPr lang="en-US" smtClean="0"/>
               <a:pPr/>
-              <a:t>7/14/2013</a:t>
+              <a:t>7/20/2013</a:t>
             </a:fld>
             <a:endParaRPr lang="en-US" dirty="0"/>
           </a:p>
@@ -1851,7 +1852,7 @@
             <a:fld id="{1D8BD707-D9CF-40AE-B4C6-C98DA3205C09}" type="datetimeFigureOut">
               <a:rPr lang="en-US" smtClean="0"/>
               <a:pPr/>
-              <a:t>7/14/2013</a:t>
+              <a:t>7/20/2013</a:t>
             </a:fld>
             <a:endParaRPr lang="en-US" dirty="0"/>
           </a:p>
@@ -2136,7 +2137,7 @@
             <a:fld id="{1D8BD707-D9CF-40AE-B4C6-C98DA3205C09}" type="datetimeFigureOut">
               <a:rPr lang="en-US" smtClean="0"/>
               <a:pPr/>
-              <a:t>7/14/2013</a:t>
+              <a:t>7/20/2013</a:t>
             </a:fld>
             <a:endParaRPr lang="en-US" dirty="0"/>
           </a:p>
@@ -2555,7 +2556,7 @@
             <a:fld id="{1D8BD707-D9CF-40AE-B4C6-C98DA3205C09}" type="datetimeFigureOut">
               <a:rPr lang="en-US" smtClean="0"/>
               <a:pPr/>
-              <a:t>7/14/2013</a:t>
+              <a:t>7/20/2013</a:t>
             </a:fld>
             <a:endParaRPr lang="en-US" dirty="0"/>
           </a:p>
@@ -2670,7 +2671,7 @@
             <a:fld id="{1D8BD707-D9CF-40AE-B4C6-C98DA3205C09}" type="datetimeFigureOut">
               <a:rPr lang="en-US" smtClean="0"/>
               <a:pPr/>
-              <a:t>7/14/2013</a:t>
+              <a:t>7/20/2013</a:t>
             </a:fld>
             <a:endParaRPr lang="en-US" dirty="0"/>
           </a:p>
@@ -2762,7 +2763,7 @@
             <a:fld id="{1D8BD707-D9CF-40AE-B4C6-C98DA3205C09}" type="datetimeFigureOut">
               <a:rPr lang="en-US" smtClean="0"/>
               <a:pPr/>
-              <a:t>7/14/2013</a:t>
+              <a:t>7/20/2013</a:t>
             </a:fld>
             <a:endParaRPr lang="en-US" dirty="0"/>
           </a:p>
@@ -3036,7 +3037,7 @@
             <a:fld id="{1D8BD707-D9CF-40AE-B4C6-C98DA3205C09}" type="datetimeFigureOut">
               <a:rPr lang="en-US" smtClean="0"/>
               <a:pPr/>
-              <a:t>7/14/2013</a:t>
+              <a:t>7/20/2013</a:t>
             </a:fld>
             <a:endParaRPr lang="en-US" dirty="0"/>
           </a:p>
@@ -3286,7 +3287,7 @@
             <a:fld id="{1D8BD707-D9CF-40AE-B4C6-C98DA3205C09}" type="datetimeFigureOut">
               <a:rPr lang="en-US" smtClean="0"/>
               <a:pPr/>
-              <a:t>7/14/2013</a:t>
+              <a:t>7/20/2013</a:t>
             </a:fld>
             <a:endParaRPr lang="en-US" dirty="0"/>
           </a:p>
@@ -3496,7 +3497,7 @@
             <a:fld id="{1D8BD707-D9CF-40AE-B4C6-C98DA3205C09}" type="datetimeFigureOut">
               <a:rPr lang="en-US" smtClean="0"/>
               <a:pPr/>
-              <a:t>7/14/2013</a:t>
+              <a:t>7/20/2013</a:t>
             </a:fld>
             <a:endParaRPr lang="en-US" dirty="0"/>
           </a:p>
@@ -4139,17 +4140,63 @@
           </a:p>
         </p:txBody>
       </p:sp>
+    </p:spTree>
+    <p:extLst>
+      <p:ext uri="{BB962C8B-B14F-4D97-AF65-F5344CB8AC3E}">
+        <p14:creationId xmlns:p14="http://schemas.microsoft.com/office/powerpoint/2010/main" val="791893387"/>
+      </p:ext>
+    </p:extLst>
+  </p:cSld>
+  <p:clrMapOvr>
+    <a:masterClrMapping/>
+  </p:clrMapOvr>
+  <p:timing>
+    <p:tnLst>
+      <p:par>
+        <p:cTn id="1" dur="indefinite" restart="never" nodeType="tmRoot"/>
+      </p:par>
+    </p:tnLst>
+  </p:timing>
+</p:sld>
+</file>
+
+<file path=ppt/slides/slide12.xml><?xml version="1.0" encoding="utf-8"?>
+<p:sld xmlns:a="http://schemas.openxmlformats.org/drawingml/2006/main" xmlns:r="http://schemas.openxmlformats.org/officeDocument/2006/relationships" xmlns:p="http://schemas.openxmlformats.org/presentationml/2006/main">
+  <p:cSld>
+    <p:spTree>
+      <p:nvGrpSpPr>
+        <p:cNvPr id="1" name=""/>
+        <p:cNvGrpSpPr/>
+        <p:nvPr/>
+      </p:nvGrpSpPr>
+      <p:grpSpPr>
+        <a:xfrm>
+          <a:off x="0" y="0"/>
+          <a:ext cx="0" cy="0"/>
+          <a:chOff x="0" y="0"/>
+          <a:chExt cx="0" cy="0"/>
+        </a:xfrm>
+      </p:grpSpPr>
       <p:pic>
         <p:nvPicPr>
-          <p:cNvPr id="6147" name="Picture 3"/>
+          <p:cNvPr id="2" name="Picture 2"/>
           <p:cNvPicPr>
             <a:picLocks noChangeAspect="1" noChangeArrowheads="1"/>
           </p:cNvPicPr>
           <p:nvPr/>
         </p:nvPicPr>
         <p:blipFill>
-          <a:blip r:embed="rId4">
+          <a:blip r:embed="rId2">
             <a:extLst>
+              <a:ext uri="{BEBA8EAE-BF5A-486C-A8C5-ECC9F3942E4B}">
+                <a14:imgProps xmlns:a14="http://schemas.microsoft.com/office/drawing/2010/main">
+                  <a14:imgLayer r:embed="rId3">
+                    <a14:imgEffect>
+                      <a14:brightnessContrast contrast="40000"/>
+                    </a14:imgEffect>
+                  </a14:imgLayer>
+                </a14:imgProps>
+              </a:ext>
               <a:ext uri="{28A0092B-C50C-407E-A947-70E740481C1C}">
                 <a14:useLocalDpi xmlns:a14="http://schemas.microsoft.com/office/drawing/2010/main" val="0"/>
               </a:ext>
@@ -4162,8 +4209,8 @@
         </p:blipFill>
         <p:spPr bwMode="auto">
           <a:xfrm>
-            <a:off x="3635870" y="3573021"/>
-            <a:ext cx="5211320" cy="2610559"/>
+            <a:off x="2716559" y="1030990"/>
+            <a:ext cx="2071471" cy="3406150"/>
           </a:xfrm>
           <a:prstGeom prst="rect">
             <a:avLst/>
@@ -4172,7 +4219,6 @@
           <a:ln>
             <a:noFill/>
           </a:ln>
-          <a:effectLst/>
           <a:extLst>
             <a:ext uri="{909E8E84-426E-40DD-AFC4-6F175D3DCCD1}">
               <a14:hiddenFill xmlns:a14="http://schemas.microsoft.com/office/drawing/2010/main">
@@ -4191,700 +4237,19 @@
                 <a:tailEnd/>
               </a14:hiddenLine>
             </a:ext>
-            <a:ext uri="{AF507438-7753-43E0-B8FC-AC1667EBCBE1}">
-              <a14:hiddenEffects xmlns:a14="http://schemas.microsoft.com/office/drawing/2010/main">
-                <a:effectLst>
-                  <a:outerShdw dist="35921" dir="2700000" algn="ctr" rotWithShape="0">
-                    <a:schemeClr val="bg2"/>
-                  </a:outerShdw>
-                </a:effectLst>
-              </a14:hiddenEffects>
-            </a:ext>
           </a:extLst>
         </p:spPr>
       </p:pic>
-      <p:sp>
-        <p:nvSpPr>
-          <p:cNvPr id="24" name="Oval 23"/>
-          <p:cNvSpPr/>
-          <p:nvPr/>
-        </p:nvSpPr>
-        <p:spPr>
-          <a:xfrm>
-            <a:off x="2780442" y="1804971"/>
-            <a:ext cx="72010" cy="72011"/>
-          </a:xfrm>
-          <a:prstGeom prst="ellipse">
-            <a:avLst/>
-          </a:prstGeom>
-          <a:solidFill>
-            <a:srgbClr val="FF0000">
-              <a:alpha val="94000"/>
-            </a:srgbClr>
-          </a:solidFill>
-          <a:ln>
-            <a:noFill/>
-          </a:ln>
-        </p:spPr>
-        <p:style>
-          <a:lnRef idx="2">
-            <a:schemeClr val="accent1">
-              <a:shade val="50000"/>
-            </a:schemeClr>
-          </a:lnRef>
-          <a:fillRef idx="1">
-            <a:schemeClr val="accent1"/>
-          </a:fillRef>
-          <a:effectRef idx="0">
-            <a:schemeClr val="accent1"/>
-          </a:effectRef>
-          <a:fontRef idx="minor">
-            <a:schemeClr val="lt1"/>
-          </a:fontRef>
-        </p:style>
-        <p:txBody>
-          <a:bodyPr rtlCol="0" anchor="ctr"/>
-          <a:lstStyle/>
-          <a:p>
-            <a:pPr algn="ctr"/>
-            <a:endParaRPr lang="en-US" dirty="0"/>
-          </a:p>
-        </p:txBody>
-      </p:sp>
-      <p:sp>
-        <p:nvSpPr>
-          <p:cNvPr id="54" name="Oval 53"/>
-          <p:cNvSpPr/>
-          <p:nvPr/>
-        </p:nvSpPr>
-        <p:spPr>
-          <a:xfrm>
-            <a:off x="2423005" y="1376269"/>
-            <a:ext cx="72010" cy="72011"/>
-          </a:xfrm>
-          <a:prstGeom prst="ellipse">
-            <a:avLst/>
-          </a:prstGeom>
-          <a:solidFill>
-            <a:srgbClr val="FF0000">
-              <a:alpha val="94000"/>
-            </a:srgbClr>
-          </a:solidFill>
-          <a:ln>
-            <a:noFill/>
-          </a:ln>
-        </p:spPr>
-        <p:style>
-          <a:lnRef idx="2">
-            <a:schemeClr val="accent1">
-              <a:shade val="50000"/>
-            </a:schemeClr>
-          </a:lnRef>
-          <a:fillRef idx="1">
-            <a:schemeClr val="accent1"/>
-          </a:fillRef>
-          <a:effectRef idx="0">
-            <a:schemeClr val="accent1"/>
-          </a:effectRef>
-          <a:fontRef idx="minor">
-            <a:schemeClr val="lt1"/>
-          </a:fontRef>
-        </p:style>
-        <p:txBody>
-          <a:bodyPr rtlCol="0" anchor="ctr"/>
-          <a:lstStyle/>
-          <a:p>
-            <a:pPr algn="ctr"/>
-            <a:endParaRPr lang="en-US" dirty="0"/>
-          </a:p>
-        </p:txBody>
-      </p:sp>
-      <p:sp>
-        <p:nvSpPr>
-          <p:cNvPr id="55" name="Oval 54"/>
-          <p:cNvSpPr/>
-          <p:nvPr/>
-        </p:nvSpPr>
-        <p:spPr>
-          <a:xfrm>
-            <a:off x="2392525" y="1137380"/>
-            <a:ext cx="72010" cy="72011"/>
-          </a:xfrm>
-          <a:prstGeom prst="ellipse">
-            <a:avLst/>
-          </a:prstGeom>
-          <a:solidFill>
-            <a:srgbClr val="FF0000">
-              <a:alpha val="94000"/>
-            </a:srgbClr>
-          </a:solidFill>
-          <a:ln>
-            <a:noFill/>
-          </a:ln>
-        </p:spPr>
-        <p:style>
-          <a:lnRef idx="2">
-            <a:schemeClr val="accent1">
-              <a:shade val="50000"/>
-            </a:schemeClr>
-          </a:lnRef>
-          <a:fillRef idx="1">
-            <a:schemeClr val="accent1"/>
-          </a:fillRef>
-          <a:effectRef idx="0">
-            <a:schemeClr val="accent1"/>
-          </a:effectRef>
-          <a:fontRef idx="minor">
-            <a:schemeClr val="lt1"/>
-          </a:fontRef>
-        </p:style>
-        <p:txBody>
-          <a:bodyPr rtlCol="0" anchor="ctr"/>
-          <a:lstStyle/>
-          <a:p>
-            <a:pPr algn="ctr"/>
-            <a:endParaRPr lang="en-US" dirty="0"/>
-          </a:p>
-        </p:txBody>
-      </p:sp>
-      <p:sp>
-        <p:nvSpPr>
-          <p:cNvPr id="56" name="Oval 55"/>
-          <p:cNvSpPr/>
-          <p:nvPr/>
-        </p:nvSpPr>
-        <p:spPr>
-          <a:xfrm>
-            <a:off x="2680565" y="906109"/>
-            <a:ext cx="72010" cy="72011"/>
-          </a:xfrm>
-          <a:prstGeom prst="ellipse">
-            <a:avLst/>
-          </a:prstGeom>
-          <a:solidFill>
-            <a:srgbClr val="FF0000">
-              <a:alpha val="94000"/>
-            </a:srgbClr>
-          </a:solidFill>
-          <a:ln>
-            <a:noFill/>
-          </a:ln>
-        </p:spPr>
-        <p:style>
-          <a:lnRef idx="2">
-            <a:schemeClr val="accent1">
-              <a:shade val="50000"/>
-            </a:schemeClr>
-          </a:lnRef>
-          <a:fillRef idx="1">
-            <a:schemeClr val="accent1"/>
-          </a:fillRef>
-          <a:effectRef idx="0">
-            <a:schemeClr val="accent1"/>
-          </a:effectRef>
-          <a:fontRef idx="minor">
-            <a:schemeClr val="lt1"/>
-          </a:fontRef>
-        </p:style>
-        <p:txBody>
-          <a:bodyPr rtlCol="0" anchor="ctr"/>
-          <a:lstStyle/>
-          <a:p>
-            <a:pPr algn="ctr"/>
-            <a:endParaRPr lang="en-US" dirty="0"/>
-          </a:p>
-        </p:txBody>
-      </p:sp>
-      <p:sp>
-        <p:nvSpPr>
-          <p:cNvPr id="57" name="Oval 56"/>
-          <p:cNvSpPr/>
-          <p:nvPr/>
-        </p:nvSpPr>
-        <p:spPr>
-          <a:xfrm>
-            <a:off x="2669515" y="1239869"/>
-            <a:ext cx="72010" cy="72011"/>
-          </a:xfrm>
-          <a:prstGeom prst="ellipse">
-            <a:avLst/>
-          </a:prstGeom>
-          <a:solidFill>
-            <a:srgbClr val="FF0000">
-              <a:alpha val="94000"/>
-            </a:srgbClr>
-          </a:solidFill>
-          <a:ln>
-            <a:noFill/>
-          </a:ln>
-        </p:spPr>
-        <p:style>
-          <a:lnRef idx="2">
-            <a:schemeClr val="accent1">
-              <a:shade val="50000"/>
-            </a:schemeClr>
-          </a:lnRef>
-          <a:fillRef idx="1">
-            <a:schemeClr val="accent1"/>
-          </a:fillRef>
-          <a:effectRef idx="0">
-            <a:schemeClr val="accent1"/>
-          </a:effectRef>
-          <a:fontRef idx="minor">
-            <a:schemeClr val="lt1"/>
-          </a:fontRef>
-        </p:style>
-        <p:txBody>
-          <a:bodyPr rtlCol="0" anchor="ctr"/>
-          <a:lstStyle/>
-          <a:p>
-            <a:pPr algn="ctr"/>
-            <a:endParaRPr lang="en-US" dirty="0"/>
-          </a:p>
-        </p:txBody>
-      </p:sp>
-      <p:sp>
-        <p:nvSpPr>
-          <p:cNvPr id="58" name="Oval 57"/>
-          <p:cNvSpPr/>
-          <p:nvPr/>
-        </p:nvSpPr>
-        <p:spPr>
-          <a:xfrm>
-            <a:off x="2862685" y="1201769"/>
-            <a:ext cx="72010" cy="72011"/>
-          </a:xfrm>
-          <a:prstGeom prst="ellipse">
-            <a:avLst/>
-          </a:prstGeom>
-          <a:solidFill>
-            <a:srgbClr val="FF0000">
-              <a:alpha val="94000"/>
-            </a:srgbClr>
-          </a:solidFill>
-          <a:ln>
-            <a:noFill/>
-          </a:ln>
-        </p:spPr>
-        <p:style>
-          <a:lnRef idx="2">
-            <a:schemeClr val="accent1">
-              <a:shade val="50000"/>
-            </a:schemeClr>
-          </a:lnRef>
-          <a:fillRef idx="1">
-            <a:schemeClr val="accent1"/>
-          </a:fillRef>
-          <a:effectRef idx="0">
-            <a:schemeClr val="accent1"/>
-          </a:effectRef>
-          <a:fontRef idx="minor">
-            <a:schemeClr val="lt1"/>
-          </a:fontRef>
-        </p:style>
-        <p:txBody>
-          <a:bodyPr rtlCol="0" anchor="ctr"/>
-          <a:lstStyle/>
-          <a:p>
-            <a:pPr algn="ctr"/>
-            <a:endParaRPr lang="en-US" dirty="0"/>
-          </a:p>
-        </p:txBody>
-      </p:sp>
-      <p:sp>
-        <p:nvSpPr>
-          <p:cNvPr id="59" name="Oval 58"/>
-          <p:cNvSpPr/>
-          <p:nvPr/>
-        </p:nvSpPr>
-        <p:spPr>
-          <a:xfrm>
-            <a:off x="2888975" y="849340"/>
-            <a:ext cx="72010" cy="72011"/>
-          </a:xfrm>
-          <a:prstGeom prst="ellipse">
-            <a:avLst/>
-          </a:prstGeom>
-          <a:solidFill>
-            <a:srgbClr val="FF0000">
-              <a:alpha val="94000"/>
-            </a:srgbClr>
-          </a:solidFill>
-          <a:ln>
-            <a:noFill/>
-          </a:ln>
-        </p:spPr>
-        <p:style>
-          <a:lnRef idx="2">
-            <a:schemeClr val="accent1">
-              <a:shade val="50000"/>
-            </a:schemeClr>
-          </a:lnRef>
-          <a:fillRef idx="1">
-            <a:schemeClr val="accent1"/>
-          </a:fillRef>
-          <a:effectRef idx="0">
-            <a:schemeClr val="accent1"/>
-          </a:effectRef>
-          <a:fontRef idx="minor">
-            <a:schemeClr val="lt1"/>
-          </a:fontRef>
-        </p:style>
-        <p:txBody>
-          <a:bodyPr rtlCol="0" anchor="ctr"/>
-          <a:lstStyle/>
-          <a:p>
-            <a:pPr algn="ctr"/>
-            <a:endParaRPr lang="en-US" dirty="0"/>
-          </a:p>
-        </p:txBody>
-      </p:sp>
-      <p:sp>
-        <p:nvSpPr>
-          <p:cNvPr id="60" name="Oval 59"/>
-          <p:cNvSpPr/>
-          <p:nvPr/>
-        </p:nvSpPr>
-        <p:spPr>
-          <a:xfrm>
-            <a:off x="3127865" y="970500"/>
-            <a:ext cx="72010" cy="72011"/>
-          </a:xfrm>
-          <a:prstGeom prst="ellipse">
-            <a:avLst/>
-          </a:prstGeom>
-          <a:solidFill>
-            <a:srgbClr val="FF0000">
-              <a:alpha val="94000"/>
-            </a:srgbClr>
-          </a:solidFill>
-          <a:ln>
-            <a:noFill/>
-          </a:ln>
-        </p:spPr>
-        <p:style>
-          <a:lnRef idx="2">
-            <a:schemeClr val="accent1">
-              <a:shade val="50000"/>
-            </a:schemeClr>
-          </a:lnRef>
-          <a:fillRef idx="1">
-            <a:schemeClr val="accent1"/>
-          </a:fillRef>
-          <a:effectRef idx="0">
-            <a:schemeClr val="accent1"/>
-          </a:effectRef>
-          <a:fontRef idx="minor">
-            <a:schemeClr val="lt1"/>
-          </a:fontRef>
-        </p:style>
-        <p:txBody>
-          <a:bodyPr rtlCol="0" anchor="ctr"/>
-          <a:lstStyle/>
-          <a:p>
-            <a:pPr algn="ctr"/>
-            <a:endParaRPr lang="en-US" dirty="0"/>
-          </a:p>
-        </p:txBody>
-      </p:sp>
-      <p:sp>
-        <p:nvSpPr>
-          <p:cNvPr id="61" name="Oval 60"/>
-          <p:cNvSpPr/>
-          <p:nvPr/>
-        </p:nvSpPr>
-        <p:spPr>
-          <a:xfrm>
-            <a:off x="3086335" y="1281400"/>
-            <a:ext cx="72010" cy="72011"/>
-          </a:xfrm>
-          <a:prstGeom prst="ellipse">
-            <a:avLst/>
-          </a:prstGeom>
-          <a:solidFill>
-            <a:srgbClr val="FF0000">
-              <a:alpha val="94000"/>
-            </a:srgbClr>
-          </a:solidFill>
-          <a:ln>
-            <a:noFill/>
-          </a:ln>
-        </p:spPr>
-        <p:style>
-          <a:lnRef idx="2">
-            <a:schemeClr val="accent1">
-              <a:shade val="50000"/>
-            </a:schemeClr>
-          </a:lnRef>
-          <a:fillRef idx="1">
-            <a:schemeClr val="accent1"/>
-          </a:fillRef>
-          <a:effectRef idx="0">
-            <a:schemeClr val="accent1"/>
-          </a:effectRef>
-          <a:fontRef idx="minor">
-            <a:schemeClr val="lt1"/>
-          </a:fontRef>
-        </p:style>
-        <p:txBody>
-          <a:bodyPr rtlCol="0" anchor="ctr"/>
-          <a:lstStyle/>
-          <a:p>
-            <a:pPr algn="ctr"/>
-            <a:endParaRPr lang="en-US" dirty="0"/>
-          </a:p>
-        </p:txBody>
-      </p:sp>
-      <p:sp>
-        <p:nvSpPr>
-          <p:cNvPr id="62" name="Oval 61"/>
-          <p:cNvSpPr/>
-          <p:nvPr/>
-        </p:nvSpPr>
-        <p:spPr>
-          <a:xfrm>
-            <a:off x="3238735" y="1610969"/>
-            <a:ext cx="72010" cy="72011"/>
-          </a:xfrm>
-          <a:prstGeom prst="ellipse">
-            <a:avLst/>
-          </a:prstGeom>
-          <a:solidFill>
-            <a:srgbClr val="FF0000">
-              <a:alpha val="94000"/>
-            </a:srgbClr>
-          </a:solidFill>
-          <a:ln>
-            <a:noFill/>
-          </a:ln>
-        </p:spPr>
-        <p:style>
-          <a:lnRef idx="2">
-            <a:schemeClr val="accent1">
-              <a:shade val="50000"/>
-            </a:schemeClr>
-          </a:lnRef>
-          <a:fillRef idx="1">
-            <a:schemeClr val="accent1"/>
-          </a:fillRef>
-          <a:effectRef idx="0">
-            <a:schemeClr val="accent1"/>
-          </a:effectRef>
-          <a:fontRef idx="minor">
-            <a:schemeClr val="lt1"/>
-          </a:fontRef>
-        </p:style>
-        <p:txBody>
-          <a:bodyPr rtlCol="0" anchor="ctr"/>
-          <a:lstStyle/>
-          <a:p>
-            <a:pPr algn="ctr"/>
-            <a:endParaRPr lang="en-US" dirty="0"/>
-          </a:p>
-        </p:txBody>
-      </p:sp>
-      <p:sp>
-        <p:nvSpPr>
-          <p:cNvPr id="63" name="Oval 62"/>
-          <p:cNvSpPr/>
-          <p:nvPr/>
-        </p:nvSpPr>
-        <p:spPr>
-          <a:xfrm>
-            <a:off x="3230355" y="1778609"/>
-            <a:ext cx="72010" cy="72011"/>
-          </a:xfrm>
-          <a:prstGeom prst="ellipse">
-            <a:avLst/>
-          </a:prstGeom>
-          <a:solidFill>
-            <a:srgbClr val="FF0000">
-              <a:alpha val="94000"/>
-            </a:srgbClr>
-          </a:solidFill>
-          <a:ln>
-            <a:noFill/>
-          </a:ln>
-        </p:spPr>
-        <p:style>
-          <a:lnRef idx="2">
-            <a:schemeClr val="accent1">
-              <a:shade val="50000"/>
-            </a:schemeClr>
-          </a:lnRef>
-          <a:fillRef idx="1">
-            <a:schemeClr val="accent1"/>
-          </a:fillRef>
-          <a:effectRef idx="0">
-            <a:schemeClr val="accent1"/>
-          </a:effectRef>
-          <a:fontRef idx="minor">
-            <a:schemeClr val="lt1"/>
-          </a:fontRef>
-        </p:style>
-        <p:txBody>
-          <a:bodyPr rtlCol="0" anchor="ctr"/>
-          <a:lstStyle/>
-          <a:p>
-            <a:pPr algn="ctr"/>
-            <a:endParaRPr lang="en-US" dirty="0"/>
-          </a:p>
-        </p:txBody>
-      </p:sp>
-      <p:sp>
-        <p:nvSpPr>
-          <p:cNvPr id="64" name="Oval 63"/>
-          <p:cNvSpPr/>
-          <p:nvPr/>
-        </p:nvSpPr>
-        <p:spPr>
-          <a:xfrm>
-            <a:off x="3093955" y="2073509"/>
-            <a:ext cx="72010" cy="72011"/>
-          </a:xfrm>
-          <a:prstGeom prst="ellipse">
-            <a:avLst/>
-          </a:prstGeom>
-          <a:solidFill>
-            <a:srgbClr val="FF0000">
-              <a:alpha val="94000"/>
-            </a:srgbClr>
-          </a:solidFill>
-          <a:ln>
-            <a:noFill/>
-          </a:ln>
-        </p:spPr>
-        <p:style>
-          <a:lnRef idx="2">
-            <a:schemeClr val="accent1">
-              <a:shade val="50000"/>
-            </a:schemeClr>
-          </a:lnRef>
-          <a:fillRef idx="1">
-            <a:schemeClr val="accent1"/>
-          </a:fillRef>
-          <a:effectRef idx="0">
-            <a:schemeClr val="accent1"/>
-          </a:effectRef>
-          <a:fontRef idx="minor">
-            <a:schemeClr val="lt1"/>
-          </a:fontRef>
-        </p:style>
-        <p:txBody>
-          <a:bodyPr rtlCol="0" anchor="ctr"/>
-          <a:lstStyle/>
-          <a:p>
-            <a:pPr algn="ctr"/>
-            <a:endParaRPr lang="en-US" dirty="0"/>
-          </a:p>
-        </p:txBody>
-      </p:sp>
-      <p:sp>
-        <p:nvSpPr>
-          <p:cNvPr id="65" name="Oval 64"/>
-          <p:cNvSpPr/>
-          <p:nvPr/>
-        </p:nvSpPr>
-        <p:spPr>
-          <a:xfrm>
-            <a:off x="2775435" y="2433560"/>
-            <a:ext cx="72010" cy="72011"/>
-          </a:xfrm>
-          <a:prstGeom prst="ellipse">
-            <a:avLst/>
-          </a:prstGeom>
-          <a:solidFill>
-            <a:srgbClr val="FF0000">
-              <a:alpha val="94000"/>
-            </a:srgbClr>
-          </a:solidFill>
-          <a:ln>
-            <a:noFill/>
-          </a:ln>
-        </p:spPr>
-        <p:style>
-          <a:lnRef idx="2">
-            <a:schemeClr val="accent1">
-              <a:shade val="50000"/>
-            </a:schemeClr>
-          </a:lnRef>
-          <a:fillRef idx="1">
-            <a:schemeClr val="accent1"/>
-          </a:fillRef>
-          <a:effectRef idx="0">
-            <a:schemeClr val="accent1"/>
-          </a:effectRef>
-          <a:fontRef idx="minor">
-            <a:schemeClr val="lt1"/>
-          </a:fontRef>
-        </p:style>
-        <p:txBody>
-          <a:bodyPr rtlCol="0" anchor="ctr"/>
-          <a:lstStyle/>
-          <a:p>
-            <a:pPr algn="ctr"/>
-            <a:endParaRPr lang="en-US" dirty="0"/>
-          </a:p>
-        </p:txBody>
-      </p:sp>
-      <p:sp>
-        <p:nvSpPr>
-          <p:cNvPr id="66" name="Oval 65"/>
-          <p:cNvSpPr/>
-          <p:nvPr/>
-        </p:nvSpPr>
-        <p:spPr>
-          <a:xfrm>
-            <a:off x="2567025" y="2369169"/>
-            <a:ext cx="72010" cy="72011"/>
-          </a:xfrm>
-          <a:prstGeom prst="ellipse">
-            <a:avLst/>
-          </a:prstGeom>
-          <a:solidFill>
-            <a:srgbClr val="FF0000">
-              <a:alpha val="94000"/>
-            </a:srgbClr>
-          </a:solidFill>
-          <a:ln>
-            <a:noFill/>
-          </a:ln>
-        </p:spPr>
-        <p:style>
-          <a:lnRef idx="2">
-            <a:schemeClr val="accent1">
-              <a:shade val="50000"/>
-            </a:schemeClr>
-          </a:lnRef>
-          <a:fillRef idx="1">
-            <a:schemeClr val="accent1"/>
-          </a:fillRef>
-          <a:effectRef idx="0">
-            <a:schemeClr val="accent1"/>
-          </a:effectRef>
-          <a:fontRef idx="minor">
-            <a:schemeClr val="lt1"/>
-          </a:fontRef>
-        </p:style>
-        <p:txBody>
-          <a:bodyPr rtlCol="0" anchor="ctr"/>
-          <a:lstStyle/>
-          <a:p>
-            <a:pPr algn="ctr"/>
-            <a:endParaRPr lang="en-US" dirty="0"/>
-          </a:p>
-        </p:txBody>
-      </p:sp>
       <p:pic>
         <p:nvPicPr>
-          <p:cNvPr id="6149" name="Picture 5"/>
+          <p:cNvPr id="2051" name="Picture 3"/>
           <p:cNvPicPr>
             <a:picLocks noChangeAspect="1" noChangeArrowheads="1"/>
           </p:cNvPicPr>
           <p:nvPr/>
         </p:nvPicPr>
         <p:blipFill>
-          <a:blip r:embed="rId5" cstate="print">
+          <a:blip r:embed="rId4">
             <a:extLst>
               <a:ext uri="{28A0092B-C50C-407E-A947-70E740481C1C}">
                 <a14:useLocalDpi xmlns:a14="http://schemas.microsoft.com/office/drawing/2010/main" val="0"/>
@@ -4898,22 +4263,16 @@
         </p:blipFill>
         <p:spPr bwMode="auto">
           <a:xfrm>
-            <a:off x="573752" y="3670456"/>
-            <a:ext cx="2415685" cy="2415685"/>
+            <a:off x="828170" y="1069078"/>
+            <a:ext cx="1655540" cy="1639822"/>
           </a:xfrm>
           <a:prstGeom prst="rect">
             <a:avLst/>
           </a:prstGeom>
           <a:noFill/>
-          <a:ln w="9525">
-            <a:solidFill>
-              <a:schemeClr val="tx1"/>
-            </a:solidFill>
-            <a:miter lim="800000"/>
-            <a:headEnd/>
-            <a:tailEnd/>
-          </a:ln>
-          <a:effectLst/>
+          <a:ln>
+            <a:noFill/>
+          </a:ln>
           <a:extLst>
             <a:ext uri="{909E8E84-426E-40DD-AFC4-6F175D3DCCD1}">
               <a14:hiddenFill xmlns:a14="http://schemas.microsoft.com/office/drawing/2010/main">
@@ -4922,35 +4281,887 @@
                 </a:solidFill>
               </a14:hiddenFill>
             </a:ext>
-            <a:ext uri="{AF507438-7753-43E0-B8FC-AC1667EBCBE1}">
-              <a14:hiddenEffects xmlns:a14="http://schemas.microsoft.com/office/drawing/2010/main">
-                <a:effectLst>
-                  <a:outerShdw dist="35921" dir="2700000" algn="ctr" rotWithShape="0">
-                    <a:schemeClr val="bg2"/>
-                  </a:outerShdw>
-                </a:effectLst>
-              </a14:hiddenEffects>
+            <a:ext uri="{91240B29-F687-4F45-9708-019B960494DF}">
+              <a14:hiddenLine xmlns:a14="http://schemas.microsoft.com/office/drawing/2010/main" w="9525">
+                <a:solidFill>
+                  <a:schemeClr val="tx1"/>
+                </a:solidFill>
+                <a:miter lim="800000"/>
+                <a:headEnd/>
+                <a:tailEnd/>
+              </a14:hiddenLine>
             </a:ext>
           </a:extLst>
         </p:spPr>
       </p:pic>
+      <p:pic>
+        <p:nvPicPr>
+          <p:cNvPr id="2052" name="Picture 4"/>
+          <p:cNvPicPr>
+            <a:picLocks noChangeAspect="1" noChangeArrowheads="1"/>
+          </p:cNvPicPr>
+          <p:nvPr/>
+        </p:nvPicPr>
+        <p:blipFill>
+          <a:blip r:embed="rId5">
+            <a:extLst>
+              <a:ext uri="{28A0092B-C50C-407E-A947-70E740481C1C}">
+                <a14:useLocalDpi xmlns:a14="http://schemas.microsoft.com/office/drawing/2010/main" val="0"/>
+              </a:ext>
+            </a:extLst>
+          </a:blip>
+          <a:srcRect/>
+          <a:stretch>
+            <a:fillRect/>
+          </a:stretch>
+        </p:blipFill>
+        <p:spPr bwMode="auto">
+          <a:xfrm>
+            <a:off x="827480" y="2735786"/>
+            <a:ext cx="1650300" cy="1629344"/>
+          </a:xfrm>
+          <a:prstGeom prst="rect">
+            <a:avLst/>
+          </a:prstGeom>
+          <a:noFill/>
+          <a:ln>
+            <a:noFill/>
+          </a:ln>
+          <a:extLst>
+            <a:ext uri="{909E8E84-426E-40DD-AFC4-6F175D3DCCD1}">
+              <a14:hiddenFill xmlns:a14="http://schemas.microsoft.com/office/drawing/2010/main">
+                <a:solidFill>
+                  <a:schemeClr val="accent1"/>
+                </a:solidFill>
+              </a14:hiddenFill>
+            </a:ext>
+            <a:ext uri="{91240B29-F687-4F45-9708-019B960494DF}">
+              <a14:hiddenLine xmlns:a14="http://schemas.microsoft.com/office/drawing/2010/main" w="9525">
+                <a:solidFill>
+                  <a:schemeClr val="tx1"/>
+                </a:solidFill>
+                <a:miter lim="800000"/>
+                <a:headEnd/>
+                <a:tailEnd/>
+              </a14:hiddenLine>
+            </a:ext>
+          </a:extLst>
+        </p:spPr>
+      </p:pic>
+      <p:pic>
+        <p:nvPicPr>
+          <p:cNvPr id="2053" name="Picture 5"/>
+          <p:cNvPicPr>
+            <a:picLocks noChangeAspect="1" noChangeArrowheads="1"/>
+          </p:cNvPicPr>
+          <p:nvPr/>
+        </p:nvPicPr>
+        <p:blipFill>
+          <a:blip r:embed="rId6">
+            <a:extLst>
+              <a:ext uri="{28A0092B-C50C-407E-A947-70E740481C1C}">
+                <a14:useLocalDpi xmlns:a14="http://schemas.microsoft.com/office/drawing/2010/main" val="0"/>
+              </a:ext>
+            </a:extLst>
+          </a:blip>
+          <a:srcRect/>
+          <a:stretch>
+            <a:fillRect/>
+          </a:stretch>
+        </p:blipFill>
+        <p:spPr bwMode="auto">
+          <a:xfrm>
+            <a:off x="5055804" y="2741025"/>
+            <a:ext cx="1666018" cy="1624105"/>
+          </a:xfrm>
+          <a:prstGeom prst="rect">
+            <a:avLst/>
+          </a:prstGeom>
+          <a:noFill/>
+          <a:ln>
+            <a:noFill/>
+          </a:ln>
+          <a:extLst>
+            <a:ext uri="{909E8E84-426E-40DD-AFC4-6F175D3DCCD1}">
+              <a14:hiddenFill xmlns:a14="http://schemas.microsoft.com/office/drawing/2010/main">
+                <a:solidFill>
+                  <a:schemeClr val="accent1"/>
+                </a:solidFill>
+              </a14:hiddenFill>
+            </a:ext>
+            <a:ext uri="{91240B29-F687-4F45-9708-019B960494DF}">
+              <a14:hiddenLine xmlns:a14="http://schemas.microsoft.com/office/drawing/2010/main" w="9525">
+                <a:solidFill>
+                  <a:schemeClr val="tx1"/>
+                </a:solidFill>
+                <a:miter lim="800000"/>
+                <a:headEnd/>
+                <a:tailEnd/>
+              </a14:hiddenLine>
+            </a:ext>
+          </a:extLst>
+        </p:spPr>
+      </p:pic>
+      <p:pic>
+        <p:nvPicPr>
+          <p:cNvPr id="2054" name="Picture 6"/>
+          <p:cNvPicPr>
+            <a:picLocks noChangeAspect="1" noChangeArrowheads="1"/>
+          </p:cNvPicPr>
+          <p:nvPr/>
+        </p:nvPicPr>
+        <p:blipFill>
+          <a:blip r:embed="rId7">
+            <a:extLst>
+              <a:ext uri="{28A0092B-C50C-407E-A947-70E740481C1C}">
+                <a14:useLocalDpi xmlns:a14="http://schemas.microsoft.com/office/drawing/2010/main" val="0"/>
+              </a:ext>
+            </a:extLst>
+          </a:blip>
+          <a:srcRect/>
+          <a:stretch>
+            <a:fillRect/>
+          </a:stretch>
+        </p:blipFill>
+        <p:spPr bwMode="auto">
+          <a:xfrm>
+            <a:off x="5055804" y="1074317"/>
+            <a:ext cx="1676496" cy="1634583"/>
+          </a:xfrm>
+          <a:prstGeom prst="rect">
+            <a:avLst/>
+          </a:prstGeom>
+          <a:noFill/>
+          <a:ln>
+            <a:noFill/>
+          </a:ln>
+          <a:extLst>
+            <a:ext uri="{909E8E84-426E-40DD-AFC4-6F175D3DCCD1}">
+              <a14:hiddenFill xmlns:a14="http://schemas.microsoft.com/office/drawing/2010/main">
+                <a:solidFill>
+                  <a:schemeClr val="accent1"/>
+                </a:solidFill>
+              </a14:hiddenFill>
+            </a:ext>
+            <a:ext uri="{91240B29-F687-4F45-9708-019B960494DF}">
+              <a14:hiddenLine xmlns:a14="http://schemas.microsoft.com/office/drawing/2010/main" w="9525">
+                <a:solidFill>
+                  <a:schemeClr val="tx1"/>
+                </a:solidFill>
+                <a:miter lim="800000"/>
+                <a:headEnd/>
+                <a:tailEnd/>
+              </a14:hiddenLine>
+            </a:ext>
+          </a:extLst>
+        </p:spPr>
+      </p:pic>
+      <p:sp>
+        <p:nvSpPr>
+          <p:cNvPr id="22" name="Oval 21"/>
+          <p:cNvSpPr/>
+          <p:nvPr/>
+        </p:nvSpPr>
+        <p:spPr>
+          <a:xfrm>
+            <a:off x="3613644" y="2599323"/>
+            <a:ext cx="116181" cy="116182"/>
+          </a:xfrm>
+          <a:prstGeom prst="ellipse">
+            <a:avLst/>
+          </a:prstGeom>
+          <a:solidFill>
+            <a:schemeClr val="bg1"/>
+          </a:solidFill>
+          <a:ln>
+            <a:solidFill>
+              <a:schemeClr val="tx1"/>
+            </a:solidFill>
+          </a:ln>
+        </p:spPr>
+        <p:style>
+          <a:lnRef idx="2">
+            <a:schemeClr val="accent1">
+              <a:shade val="50000"/>
+            </a:schemeClr>
+          </a:lnRef>
+          <a:fillRef idx="1">
+            <a:schemeClr val="accent1"/>
+          </a:fillRef>
+          <a:effectRef idx="0">
+            <a:schemeClr val="accent1"/>
+          </a:effectRef>
+          <a:fontRef idx="minor">
+            <a:schemeClr val="lt1"/>
+          </a:fontRef>
+        </p:style>
+        <p:txBody>
+          <a:bodyPr rtlCol="0" anchor="ctr"/>
+          <a:lstStyle/>
+          <a:p>
+            <a:pPr algn="ctr"/>
+            <a:endParaRPr lang="en-US" dirty="0"/>
+          </a:p>
+        </p:txBody>
+      </p:sp>
+      <p:sp>
+        <p:nvSpPr>
+          <p:cNvPr id="23" name="Oval 22"/>
+          <p:cNvSpPr/>
+          <p:nvPr/>
+        </p:nvSpPr>
+        <p:spPr>
+          <a:xfrm>
+            <a:off x="3036956" y="1907657"/>
+            <a:ext cx="116181" cy="116182"/>
+          </a:xfrm>
+          <a:prstGeom prst="ellipse">
+            <a:avLst/>
+          </a:prstGeom>
+          <a:solidFill>
+            <a:schemeClr val="bg1"/>
+          </a:solidFill>
+          <a:ln>
+            <a:solidFill>
+              <a:schemeClr val="tx1"/>
+            </a:solidFill>
+          </a:ln>
+        </p:spPr>
+        <p:style>
+          <a:lnRef idx="2">
+            <a:schemeClr val="accent1">
+              <a:shade val="50000"/>
+            </a:schemeClr>
+          </a:lnRef>
+          <a:fillRef idx="1">
+            <a:schemeClr val="accent1"/>
+          </a:fillRef>
+          <a:effectRef idx="0">
+            <a:schemeClr val="accent1"/>
+          </a:effectRef>
+          <a:fontRef idx="minor">
+            <a:schemeClr val="lt1"/>
+          </a:fontRef>
+        </p:style>
+        <p:txBody>
+          <a:bodyPr rtlCol="0" anchor="ctr"/>
+          <a:lstStyle/>
+          <a:p>
+            <a:pPr algn="ctr"/>
+            <a:endParaRPr lang="en-US" dirty="0"/>
+          </a:p>
+        </p:txBody>
+      </p:sp>
+      <p:sp>
+        <p:nvSpPr>
+          <p:cNvPr id="24" name="Oval 23"/>
+          <p:cNvSpPr/>
+          <p:nvPr/>
+        </p:nvSpPr>
+        <p:spPr>
+          <a:xfrm>
+            <a:off x="3006830" y="1541285"/>
+            <a:ext cx="116181" cy="116182"/>
+          </a:xfrm>
+          <a:prstGeom prst="ellipse">
+            <a:avLst/>
+          </a:prstGeom>
+          <a:solidFill>
+            <a:srgbClr val="7BD7D3"/>
+          </a:solidFill>
+          <a:ln>
+            <a:solidFill>
+              <a:schemeClr val="tx1"/>
+            </a:solidFill>
+          </a:ln>
+        </p:spPr>
+        <p:style>
+          <a:lnRef idx="2">
+            <a:schemeClr val="accent1">
+              <a:shade val="50000"/>
+            </a:schemeClr>
+          </a:lnRef>
+          <a:fillRef idx="1">
+            <a:schemeClr val="accent1"/>
+          </a:fillRef>
+          <a:effectRef idx="0">
+            <a:schemeClr val="accent1"/>
+          </a:effectRef>
+          <a:fontRef idx="minor">
+            <a:schemeClr val="lt1"/>
+          </a:fontRef>
+        </p:style>
+        <p:txBody>
+          <a:bodyPr rtlCol="0" anchor="ctr"/>
+          <a:lstStyle/>
+          <a:p>
+            <a:pPr algn="ctr"/>
+            <a:endParaRPr lang="en-US" dirty="0">
+              <a:ln>
+                <a:solidFill>
+                  <a:schemeClr val="tx1"/>
+                </a:solidFill>
+              </a:ln>
+            </a:endParaRPr>
+          </a:p>
+        </p:txBody>
+      </p:sp>
+      <p:sp>
+        <p:nvSpPr>
+          <p:cNvPr id="25" name="Oval 24"/>
+          <p:cNvSpPr/>
+          <p:nvPr/>
+        </p:nvSpPr>
+        <p:spPr>
+          <a:xfrm>
+            <a:off x="3420752" y="1174503"/>
+            <a:ext cx="116181" cy="116182"/>
+          </a:xfrm>
+          <a:prstGeom prst="ellipse">
+            <a:avLst/>
+          </a:prstGeom>
+          <a:solidFill>
+            <a:srgbClr val="FFC000"/>
+          </a:solidFill>
+          <a:ln>
+            <a:solidFill>
+              <a:schemeClr val="tx1"/>
+            </a:solidFill>
+          </a:ln>
+        </p:spPr>
+        <p:style>
+          <a:lnRef idx="2">
+            <a:schemeClr val="accent1">
+              <a:shade val="50000"/>
+            </a:schemeClr>
+          </a:lnRef>
+          <a:fillRef idx="1">
+            <a:schemeClr val="accent1"/>
+          </a:fillRef>
+          <a:effectRef idx="0">
+            <a:schemeClr val="accent1"/>
+          </a:effectRef>
+          <a:fontRef idx="minor">
+            <a:schemeClr val="lt1"/>
+          </a:fontRef>
+        </p:style>
+        <p:txBody>
+          <a:bodyPr rtlCol="0" anchor="ctr"/>
+          <a:lstStyle/>
+          <a:p>
+            <a:pPr algn="ctr"/>
+            <a:endParaRPr lang="en-US" dirty="0">
+              <a:ln>
+                <a:solidFill>
+                  <a:schemeClr val="tx1"/>
+                </a:solidFill>
+              </a:ln>
+            </a:endParaRPr>
+          </a:p>
+        </p:txBody>
+      </p:sp>
+      <p:sp>
+        <p:nvSpPr>
+          <p:cNvPr id="26" name="Oval 25"/>
+          <p:cNvSpPr/>
+          <p:nvPr/>
+        </p:nvSpPr>
+        <p:spPr>
+          <a:xfrm>
+            <a:off x="3434674" y="1687590"/>
+            <a:ext cx="116181" cy="116182"/>
+          </a:xfrm>
+          <a:prstGeom prst="ellipse">
+            <a:avLst/>
+          </a:prstGeom>
+          <a:solidFill>
+            <a:schemeClr val="bg1"/>
+          </a:solidFill>
+          <a:ln>
+            <a:solidFill>
+              <a:schemeClr val="tx1"/>
+            </a:solidFill>
+          </a:ln>
+        </p:spPr>
+        <p:style>
+          <a:lnRef idx="2">
+            <a:schemeClr val="accent1">
+              <a:shade val="50000"/>
+            </a:schemeClr>
+          </a:lnRef>
+          <a:fillRef idx="1">
+            <a:schemeClr val="accent1"/>
+          </a:fillRef>
+          <a:effectRef idx="0">
+            <a:schemeClr val="accent1"/>
+          </a:effectRef>
+          <a:fontRef idx="minor">
+            <a:schemeClr val="lt1"/>
+          </a:fontRef>
+        </p:style>
+        <p:txBody>
+          <a:bodyPr rtlCol="0" anchor="ctr"/>
+          <a:lstStyle/>
+          <a:p>
+            <a:pPr algn="ctr"/>
+            <a:endParaRPr lang="en-US" dirty="0"/>
+          </a:p>
+        </p:txBody>
+      </p:sp>
+      <p:sp>
+        <p:nvSpPr>
+          <p:cNvPr id="27" name="Oval 26"/>
+          <p:cNvSpPr/>
+          <p:nvPr/>
+        </p:nvSpPr>
+        <p:spPr>
+          <a:xfrm>
+            <a:off x="3746334" y="1626119"/>
+            <a:ext cx="116181" cy="116182"/>
+          </a:xfrm>
+          <a:prstGeom prst="ellipse">
+            <a:avLst/>
+          </a:prstGeom>
+          <a:solidFill>
+            <a:schemeClr val="bg1"/>
+          </a:solidFill>
+          <a:ln>
+            <a:solidFill>
+              <a:schemeClr val="tx1"/>
+            </a:solidFill>
+          </a:ln>
+        </p:spPr>
+        <p:style>
+          <a:lnRef idx="2">
+            <a:schemeClr val="accent1">
+              <a:shade val="50000"/>
+            </a:schemeClr>
+          </a:lnRef>
+          <a:fillRef idx="1">
+            <a:schemeClr val="accent1"/>
+          </a:fillRef>
+          <a:effectRef idx="0">
+            <a:schemeClr val="accent1"/>
+          </a:effectRef>
+          <a:fontRef idx="minor">
+            <a:schemeClr val="lt1"/>
+          </a:fontRef>
+        </p:style>
+        <p:txBody>
+          <a:bodyPr rtlCol="0" anchor="ctr"/>
+          <a:lstStyle/>
+          <a:p>
+            <a:pPr algn="ctr"/>
+            <a:endParaRPr lang="en-US" dirty="0"/>
+          </a:p>
+        </p:txBody>
+      </p:sp>
+      <p:sp>
+        <p:nvSpPr>
+          <p:cNvPr id="28" name="Oval 27"/>
+          <p:cNvSpPr/>
+          <p:nvPr/>
+        </p:nvSpPr>
+        <p:spPr>
+          <a:xfrm>
+            <a:off x="3788750" y="1057512"/>
+            <a:ext cx="116181" cy="116182"/>
+          </a:xfrm>
+          <a:prstGeom prst="ellipse">
+            <a:avLst/>
+          </a:prstGeom>
+          <a:solidFill>
+            <a:srgbClr val="FF7979"/>
+          </a:solidFill>
+          <a:ln>
+            <a:solidFill>
+              <a:schemeClr val="tx1"/>
+            </a:solidFill>
+          </a:ln>
+        </p:spPr>
+        <p:style>
+          <a:lnRef idx="2">
+            <a:schemeClr val="accent1">
+              <a:shade val="50000"/>
+            </a:schemeClr>
+          </a:lnRef>
+          <a:fillRef idx="1">
+            <a:schemeClr val="accent1"/>
+          </a:fillRef>
+          <a:effectRef idx="0">
+            <a:schemeClr val="accent1"/>
+          </a:effectRef>
+          <a:fontRef idx="minor">
+            <a:schemeClr val="lt1"/>
+          </a:fontRef>
+        </p:style>
+        <p:txBody>
+          <a:bodyPr rtlCol="0" anchor="ctr"/>
+          <a:lstStyle/>
+          <a:p>
+            <a:pPr algn="ctr"/>
+            <a:endParaRPr lang="en-US" dirty="0">
+              <a:ln>
+                <a:solidFill>
+                  <a:schemeClr val="tx1"/>
+                </a:solidFill>
+              </a:ln>
+            </a:endParaRPr>
+          </a:p>
+        </p:txBody>
+      </p:sp>
+      <p:sp>
+        <p:nvSpPr>
+          <p:cNvPr id="29" name="Oval 28"/>
+          <p:cNvSpPr/>
+          <p:nvPr/>
+        </p:nvSpPr>
+        <p:spPr>
+          <a:xfrm>
+            <a:off x="4114540" y="1256000"/>
+            <a:ext cx="116181" cy="116182"/>
+          </a:xfrm>
+          <a:prstGeom prst="ellipse">
+            <a:avLst/>
+          </a:prstGeom>
+          <a:solidFill>
+            <a:srgbClr val="9B8BDD"/>
+          </a:solidFill>
+          <a:ln>
+            <a:solidFill>
+              <a:schemeClr val="tx1"/>
+            </a:solidFill>
+          </a:ln>
+        </p:spPr>
+        <p:style>
+          <a:lnRef idx="2">
+            <a:schemeClr val="accent1">
+              <a:shade val="50000"/>
+            </a:schemeClr>
+          </a:lnRef>
+          <a:fillRef idx="1">
+            <a:schemeClr val="accent1"/>
+          </a:fillRef>
+          <a:effectRef idx="0">
+            <a:schemeClr val="accent1"/>
+          </a:effectRef>
+          <a:fontRef idx="minor">
+            <a:schemeClr val="lt1"/>
+          </a:fontRef>
+        </p:style>
+        <p:txBody>
+          <a:bodyPr rtlCol="0" anchor="ctr"/>
+          <a:lstStyle/>
+          <a:p>
+            <a:pPr algn="ctr"/>
+            <a:endParaRPr lang="en-US" dirty="0">
+              <a:ln>
+                <a:solidFill>
+                  <a:schemeClr val="tx1"/>
+                </a:solidFill>
+              </a:ln>
+            </a:endParaRPr>
+          </a:p>
+        </p:txBody>
+      </p:sp>
+      <p:sp>
+        <p:nvSpPr>
+          <p:cNvPr id="30" name="Oval 29"/>
+          <p:cNvSpPr/>
+          <p:nvPr/>
+        </p:nvSpPr>
+        <p:spPr>
+          <a:xfrm>
+            <a:off x="4067930" y="1754596"/>
+            <a:ext cx="116181" cy="116182"/>
+          </a:xfrm>
+          <a:prstGeom prst="ellipse">
+            <a:avLst/>
+          </a:prstGeom>
+          <a:solidFill>
+            <a:schemeClr val="bg1"/>
+          </a:solidFill>
+          <a:ln>
+            <a:solidFill>
+              <a:schemeClr val="tx1"/>
+            </a:solidFill>
+          </a:ln>
+        </p:spPr>
+        <p:style>
+          <a:lnRef idx="2">
+            <a:schemeClr val="accent1">
+              <a:shade val="50000"/>
+            </a:schemeClr>
+          </a:lnRef>
+          <a:fillRef idx="1">
+            <a:schemeClr val="accent1"/>
+          </a:fillRef>
+          <a:effectRef idx="0">
+            <a:schemeClr val="accent1"/>
+          </a:effectRef>
+          <a:fontRef idx="minor">
+            <a:schemeClr val="lt1"/>
+          </a:fontRef>
+        </p:style>
+        <p:txBody>
+          <a:bodyPr rtlCol="0" anchor="ctr"/>
+          <a:lstStyle/>
+          <a:p>
+            <a:pPr algn="ctr"/>
+            <a:endParaRPr lang="en-US" dirty="0"/>
+          </a:p>
+        </p:txBody>
+      </p:sp>
+      <p:sp>
+        <p:nvSpPr>
+          <p:cNvPr id="31" name="Oval 30"/>
+          <p:cNvSpPr/>
+          <p:nvPr/>
+        </p:nvSpPr>
+        <p:spPr>
+          <a:xfrm>
+            <a:off x="4572000" y="2304678"/>
+            <a:ext cx="116181" cy="116182"/>
+          </a:xfrm>
+          <a:prstGeom prst="ellipse">
+            <a:avLst/>
+          </a:prstGeom>
+          <a:solidFill>
+            <a:schemeClr val="bg1"/>
+          </a:solidFill>
+          <a:ln>
+            <a:solidFill>
+              <a:schemeClr val="tx1"/>
+            </a:solidFill>
+          </a:ln>
+        </p:spPr>
+        <p:style>
+          <a:lnRef idx="2">
+            <a:schemeClr val="accent1">
+              <a:shade val="50000"/>
+            </a:schemeClr>
+          </a:lnRef>
+          <a:fillRef idx="1">
+            <a:schemeClr val="accent1"/>
+          </a:fillRef>
+          <a:effectRef idx="0">
+            <a:schemeClr val="accent1"/>
+          </a:effectRef>
+          <a:fontRef idx="minor">
+            <a:schemeClr val="lt1"/>
+          </a:fontRef>
+        </p:style>
+        <p:txBody>
+          <a:bodyPr rtlCol="0" anchor="ctr"/>
+          <a:lstStyle/>
+          <a:p>
+            <a:pPr algn="ctr"/>
+            <a:endParaRPr lang="en-US" dirty="0"/>
+          </a:p>
+        </p:txBody>
+      </p:sp>
+      <p:sp>
+        <p:nvSpPr>
+          <p:cNvPr id="32" name="Oval 31"/>
+          <p:cNvSpPr/>
+          <p:nvPr/>
+        </p:nvSpPr>
+        <p:spPr>
+          <a:xfrm>
+            <a:off x="4427980" y="2664728"/>
+            <a:ext cx="116181" cy="116182"/>
+          </a:xfrm>
+          <a:prstGeom prst="ellipse">
+            <a:avLst/>
+          </a:prstGeom>
+          <a:solidFill>
+            <a:schemeClr val="bg1"/>
+          </a:solidFill>
+          <a:ln>
+            <a:solidFill>
+              <a:schemeClr val="tx1"/>
+            </a:solidFill>
+          </a:ln>
+        </p:spPr>
+        <p:style>
+          <a:lnRef idx="2">
+            <a:schemeClr val="accent1">
+              <a:shade val="50000"/>
+            </a:schemeClr>
+          </a:lnRef>
+          <a:fillRef idx="1">
+            <a:schemeClr val="accent1"/>
+          </a:fillRef>
+          <a:effectRef idx="0">
+            <a:schemeClr val="accent1"/>
+          </a:effectRef>
+          <a:fontRef idx="minor">
+            <a:schemeClr val="lt1"/>
+          </a:fontRef>
+        </p:style>
+        <p:txBody>
+          <a:bodyPr rtlCol="0" anchor="ctr"/>
+          <a:lstStyle/>
+          <a:p>
+            <a:pPr algn="ctr"/>
+            <a:endParaRPr lang="en-US" dirty="0"/>
+          </a:p>
+        </p:txBody>
+      </p:sp>
+      <p:sp>
+        <p:nvSpPr>
+          <p:cNvPr id="33" name="Oval 32"/>
+          <p:cNvSpPr/>
+          <p:nvPr/>
+        </p:nvSpPr>
+        <p:spPr>
+          <a:xfrm>
+            <a:off x="4283960" y="3032581"/>
+            <a:ext cx="116181" cy="116182"/>
+          </a:xfrm>
+          <a:prstGeom prst="ellipse">
+            <a:avLst/>
+          </a:prstGeom>
+          <a:solidFill>
+            <a:schemeClr val="bg1"/>
+          </a:solidFill>
+          <a:ln>
+            <a:solidFill>
+              <a:schemeClr val="tx1"/>
+            </a:solidFill>
+          </a:ln>
+        </p:spPr>
+        <p:style>
+          <a:lnRef idx="2">
+            <a:schemeClr val="accent1">
+              <a:shade val="50000"/>
+            </a:schemeClr>
+          </a:lnRef>
+          <a:fillRef idx="1">
+            <a:schemeClr val="accent1"/>
+          </a:fillRef>
+          <a:effectRef idx="0">
+            <a:schemeClr val="accent1"/>
+          </a:effectRef>
+          <a:fontRef idx="minor">
+            <a:schemeClr val="lt1"/>
+          </a:fontRef>
+        </p:style>
+        <p:txBody>
+          <a:bodyPr rtlCol="0" anchor="ctr"/>
+          <a:lstStyle/>
+          <a:p>
+            <a:pPr algn="ctr"/>
+            <a:endParaRPr lang="en-US" dirty="0"/>
+          </a:p>
+        </p:txBody>
+      </p:sp>
+      <p:sp>
+        <p:nvSpPr>
+          <p:cNvPr id="34" name="Oval 33"/>
+          <p:cNvSpPr/>
+          <p:nvPr/>
+        </p:nvSpPr>
+        <p:spPr>
+          <a:xfrm>
+            <a:off x="3605565" y="3613486"/>
+            <a:ext cx="116181" cy="116182"/>
+          </a:xfrm>
+          <a:prstGeom prst="ellipse">
+            <a:avLst/>
+          </a:prstGeom>
+          <a:solidFill>
+            <a:schemeClr val="bg1"/>
+          </a:solidFill>
+          <a:ln>
+            <a:solidFill>
+              <a:schemeClr val="tx1"/>
+            </a:solidFill>
+          </a:ln>
+        </p:spPr>
+        <p:style>
+          <a:lnRef idx="2">
+            <a:schemeClr val="accent1">
+              <a:shade val="50000"/>
+            </a:schemeClr>
+          </a:lnRef>
+          <a:fillRef idx="1">
+            <a:schemeClr val="accent1"/>
+          </a:fillRef>
+          <a:effectRef idx="0">
+            <a:schemeClr val="accent1"/>
+          </a:effectRef>
+          <a:fontRef idx="minor">
+            <a:schemeClr val="lt1"/>
+          </a:fontRef>
+        </p:style>
+        <p:txBody>
+          <a:bodyPr rtlCol="0" anchor="ctr"/>
+          <a:lstStyle/>
+          <a:p>
+            <a:pPr algn="ctr"/>
+            <a:endParaRPr lang="en-US" dirty="0"/>
+          </a:p>
+        </p:txBody>
+      </p:sp>
+      <p:sp>
+        <p:nvSpPr>
+          <p:cNvPr id="35" name="Oval 34"/>
+          <p:cNvSpPr/>
+          <p:nvPr/>
+        </p:nvSpPr>
+        <p:spPr>
+          <a:xfrm>
+            <a:off x="3269318" y="3509598"/>
+            <a:ext cx="116181" cy="116182"/>
+          </a:xfrm>
+          <a:prstGeom prst="ellipse">
+            <a:avLst/>
+          </a:prstGeom>
+          <a:solidFill>
+            <a:schemeClr val="bg1"/>
+          </a:solidFill>
+          <a:ln>
+            <a:solidFill>
+              <a:schemeClr val="tx1"/>
+            </a:solidFill>
+          </a:ln>
+        </p:spPr>
+        <p:style>
+          <a:lnRef idx="2">
+            <a:schemeClr val="accent1">
+              <a:shade val="50000"/>
+            </a:schemeClr>
+          </a:lnRef>
+          <a:fillRef idx="1">
+            <a:schemeClr val="accent1"/>
+          </a:fillRef>
+          <a:effectRef idx="0">
+            <a:schemeClr val="accent1"/>
+          </a:effectRef>
+          <a:fontRef idx="minor">
+            <a:schemeClr val="lt1"/>
+          </a:fontRef>
+        </p:style>
+        <p:txBody>
+          <a:bodyPr rtlCol="0" anchor="ctr"/>
+          <a:lstStyle/>
+          <a:p>
+            <a:pPr algn="ctr"/>
+            <a:endParaRPr lang="en-US" dirty="0"/>
+          </a:p>
+        </p:txBody>
+      </p:sp>
     </p:spTree>
     <p:extLst>
       <p:ext uri="{BB962C8B-B14F-4D97-AF65-F5344CB8AC3E}">
-        <p14:creationId xmlns:p14="http://schemas.microsoft.com/office/powerpoint/2010/main" val="791893387"/>
+        <p14:creationId xmlns:p14="http://schemas.microsoft.com/office/powerpoint/2010/main" val="947985159"/>
       </p:ext>
     </p:extLst>
   </p:cSld>
   <p:clrMapOvr>
     <a:masterClrMapping/>
   </p:clrMapOvr>
-  <p:timing>
-    <p:tnLst>
-      <p:par>
-        <p:cTn id="1" dur="indefinite" restart="never" nodeType="tmRoot"/>
-      </p:par>
-    </p:tnLst>
-  </p:timing>
 </p:sld>
 </file>
 

</xml_diff>